<commit_message>
- Updating the intership report version Word and PDF
</commit_message>
<xml_diff>
--- a/Présentation_image.pptx
+++ b/Présentation_image.pptx
@@ -7,8 +7,13 @@
   <p:sldIdLst>
     <p:sldId id="256" r:id="rId2"/>
     <p:sldId id="257" r:id="rId3"/>
-    <p:sldId id="258" r:id="rId4"/>
-    <p:sldId id="259" r:id="rId5"/>
+    <p:sldId id="263" r:id="rId4"/>
+    <p:sldId id="258" r:id="rId5"/>
+    <p:sldId id="259" r:id="rId6"/>
+    <p:sldId id="260" r:id="rId7"/>
+    <p:sldId id="261" r:id="rId8"/>
+    <p:sldId id="262" r:id="rId9"/>
+    <p:sldId id="264" r:id="rId10"/>
   </p:sldIdLst>
   <p:sldSz cx="12192000" cy="6858000"/>
   <p:notesSz cx="6858000" cy="9144000"/>
@@ -246,7 +251,7 @@
           <a:p>
             <a:fld id="{6D53E27C-41F9-477C-981C-F16B615EFA3D}" type="datetimeFigureOut">
               <a:rPr lang="en-US" smtClean="0"/>
-              <a:t>9/27/2021</a:t>
+              <a:t>9/28/2021</a:t>
             </a:fld>
             <a:endParaRPr lang="en-US"/>
           </a:p>
@@ -416,7 +421,7 @@
           <a:p>
             <a:fld id="{6D53E27C-41F9-477C-981C-F16B615EFA3D}" type="datetimeFigureOut">
               <a:rPr lang="en-US" smtClean="0"/>
-              <a:t>9/27/2021</a:t>
+              <a:t>9/28/2021</a:t>
             </a:fld>
             <a:endParaRPr lang="en-US"/>
           </a:p>
@@ -596,7 +601,7 @@
           <a:p>
             <a:fld id="{6D53E27C-41F9-477C-981C-F16B615EFA3D}" type="datetimeFigureOut">
               <a:rPr lang="en-US" smtClean="0"/>
-              <a:t>9/27/2021</a:t>
+              <a:t>9/28/2021</a:t>
             </a:fld>
             <a:endParaRPr lang="en-US"/>
           </a:p>
@@ -766,7 +771,7 @@
           <a:p>
             <a:fld id="{6D53E27C-41F9-477C-981C-F16B615EFA3D}" type="datetimeFigureOut">
               <a:rPr lang="en-US" smtClean="0"/>
-              <a:t>9/27/2021</a:t>
+              <a:t>9/28/2021</a:t>
             </a:fld>
             <a:endParaRPr lang="en-US"/>
           </a:p>
@@ -1012,7 +1017,7 @@
           <a:p>
             <a:fld id="{6D53E27C-41F9-477C-981C-F16B615EFA3D}" type="datetimeFigureOut">
               <a:rPr lang="en-US" smtClean="0"/>
-              <a:t>9/27/2021</a:t>
+              <a:t>9/28/2021</a:t>
             </a:fld>
             <a:endParaRPr lang="en-US"/>
           </a:p>
@@ -1244,7 +1249,7 @@
           <a:p>
             <a:fld id="{6D53E27C-41F9-477C-981C-F16B615EFA3D}" type="datetimeFigureOut">
               <a:rPr lang="en-US" smtClean="0"/>
-              <a:t>9/27/2021</a:t>
+              <a:t>9/28/2021</a:t>
             </a:fld>
             <a:endParaRPr lang="en-US"/>
           </a:p>
@@ -1611,7 +1616,7 @@
           <a:p>
             <a:fld id="{6D53E27C-41F9-477C-981C-F16B615EFA3D}" type="datetimeFigureOut">
               <a:rPr lang="en-US" smtClean="0"/>
-              <a:t>9/27/2021</a:t>
+              <a:t>9/28/2021</a:t>
             </a:fld>
             <a:endParaRPr lang="en-US"/>
           </a:p>
@@ -1729,7 +1734,7 @@
           <a:p>
             <a:fld id="{6D53E27C-41F9-477C-981C-F16B615EFA3D}" type="datetimeFigureOut">
               <a:rPr lang="en-US" smtClean="0"/>
-              <a:t>9/27/2021</a:t>
+              <a:t>9/28/2021</a:t>
             </a:fld>
             <a:endParaRPr lang="en-US"/>
           </a:p>
@@ -1824,7 +1829,7 @@
           <a:p>
             <a:fld id="{6D53E27C-41F9-477C-981C-F16B615EFA3D}" type="datetimeFigureOut">
               <a:rPr lang="en-US" smtClean="0"/>
-              <a:t>9/27/2021</a:t>
+              <a:t>9/28/2021</a:t>
             </a:fld>
             <a:endParaRPr lang="en-US"/>
           </a:p>
@@ -2101,7 +2106,7 @@
           <a:p>
             <a:fld id="{6D53E27C-41F9-477C-981C-F16B615EFA3D}" type="datetimeFigureOut">
               <a:rPr lang="en-US" smtClean="0"/>
-              <a:t>9/27/2021</a:t>
+              <a:t>9/28/2021</a:t>
             </a:fld>
             <a:endParaRPr lang="en-US"/>
           </a:p>
@@ -2354,7 +2359,7 @@
           <a:p>
             <a:fld id="{6D53E27C-41F9-477C-981C-F16B615EFA3D}" type="datetimeFigureOut">
               <a:rPr lang="en-US" smtClean="0"/>
-              <a:t>9/27/2021</a:t>
+              <a:t>9/28/2021</a:t>
             </a:fld>
             <a:endParaRPr lang="en-US"/>
           </a:p>
@@ -2567,7 +2572,7 @@
           <a:p>
             <a:fld id="{6D53E27C-41F9-477C-981C-F16B615EFA3D}" type="datetimeFigureOut">
               <a:rPr lang="en-US" smtClean="0"/>
-              <a:t>9/27/2021</a:t>
+              <a:t>9/28/2021</a:t>
             </a:fld>
             <a:endParaRPr lang="en-US"/>
           </a:p>
@@ -3104,7 +3109,7 @@
         <p:spPr>
           <a:xfrm>
             <a:off x="7933191" y="3722914"/>
-            <a:ext cx="3109284" cy="2253343"/>
+            <a:ext cx="2960914" cy="2249261"/>
           </a:xfrm>
           <a:prstGeom prst="rect">
             <a:avLst/>
@@ -3658,6 +3663,36 @@
               <a:t>ddress</a:t>
             </a:r>
             <a:endParaRPr lang="en-US" sz="1500" dirty="0"/>
+          </a:p>
+        </p:txBody>
+      </p:sp>
+      <p:sp>
+        <p:nvSpPr>
+          <p:cNvPr id="2" name="ZoneTexte 1"/>
+          <p:cNvSpPr txBox="1"/>
+          <p:nvPr/>
+        </p:nvSpPr>
+        <p:spPr>
+          <a:xfrm rot="5400000">
+            <a:off x="9207429" y="3163907"/>
+            <a:ext cx="460232" cy="584775"/>
+          </a:xfrm>
+          <a:prstGeom prst="rect">
+            <a:avLst/>
+          </a:prstGeom>
+          <a:noFill/>
+        </p:spPr>
+        <p:txBody>
+          <a:bodyPr wrap="square" rtlCol="0">
+            <a:spAutoFit/>
+          </a:bodyPr>
+          <a:lstStyle/>
+          <a:p>
+            <a:r>
+              <a:rPr lang="fr-FR" sz="3200" dirty="0" smtClean="0"/>
+              <a:t>…</a:t>
+            </a:r>
+            <a:endParaRPr lang="en-US" dirty="0"/>
           </a:p>
         </p:txBody>
       </p:sp>
@@ -4135,7 +4170,7 @@
       </p:grpSpPr>
       <p:sp>
         <p:nvSpPr>
-          <p:cNvPr id="4" name="Rectangle 3"/>
+          <p:cNvPr id="5" name="Rectangle 4"/>
           <p:cNvSpPr/>
           <p:nvPr/>
         </p:nvSpPr>
@@ -4176,13 +4211,43 @@
       </p:sp>
       <p:sp>
         <p:nvSpPr>
-          <p:cNvPr id="5" name="Rectangle 4"/>
+          <p:cNvPr id="8" name="ZoneTexte 7"/>
+          <p:cNvSpPr txBox="1"/>
+          <p:nvPr/>
+        </p:nvSpPr>
+        <p:spPr>
+          <a:xfrm>
+            <a:off x="1013950" y="2939753"/>
+            <a:ext cx="1389163" cy="338554"/>
+          </a:xfrm>
+          <a:prstGeom prst="rect">
+            <a:avLst/>
+          </a:prstGeom>
+          <a:noFill/>
+        </p:spPr>
+        <p:txBody>
+          <a:bodyPr wrap="none" rtlCol="0">
+            <a:spAutoFit/>
+          </a:bodyPr>
+          <a:lstStyle/>
+          <a:p>
+            <a:r>
+              <a:rPr lang="fr-FR" sz="1600" b="1" dirty="0" smtClean="0"/>
+              <a:t>MyHttpServer</a:t>
+            </a:r>
+            <a:endParaRPr lang="en-US" b="1" dirty="0"/>
+          </a:p>
+        </p:txBody>
+      </p:sp>
+      <p:sp>
+        <p:nvSpPr>
+          <p:cNvPr id="9" name="Rectangle 8"/>
           <p:cNvSpPr/>
           <p:nvPr/>
         </p:nvSpPr>
         <p:spPr>
           <a:xfrm>
-            <a:off x="6139263" y="957129"/>
+            <a:off x="5443938" y="957129"/>
             <a:ext cx="1820254" cy="1982624"/>
           </a:xfrm>
           <a:prstGeom prst="rect">
@@ -4217,19 +4282,51 @@
       </p:sp>
       <p:sp>
         <p:nvSpPr>
-          <p:cNvPr id="6" name="Rectangle 5"/>
+          <p:cNvPr id="10" name="ZoneTexte 9"/>
+          <p:cNvSpPr txBox="1"/>
+          <p:nvPr/>
+        </p:nvSpPr>
+        <p:spPr>
+          <a:xfrm>
+            <a:off x="5746719" y="2939753"/>
+            <a:ext cx="1214692" cy="338554"/>
+          </a:xfrm>
+          <a:prstGeom prst="rect">
+            <a:avLst/>
+          </a:prstGeom>
+          <a:noFill/>
+        </p:spPr>
+        <p:txBody>
+          <a:bodyPr wrap="none" rtlCol="0">
+            <a:spAutoFit/>
+          </a:bodyPr>
+          <a:lstStyle/>
+          <a:p>
+            <a:r>
+              <a:rPr lang="fr-FR" sz="1600" b="1" dirty="0" smtClean="0"/>
+              <a:t>NanoHTTPD</a:t>
+            </a:r>
+            <a:endParaRPr lang="en-US" b="1" dirty="0"/>
+          </a:p>
+        </p:txBody>
+      </p:sp>
+      <p:sp>
+        <p:nvSpPr>
+          <p:cNvPr id="11" name="Flèche droite 10"/>
           <p:cNvSpPr/>
           <p:nvPr/>
         </p:nvSpPr>
         <p:spPr>
           <a:xfrm>
-            <a:off x="1208584" y="1579926"/>
-            <a:ext cx="975511" cy="737030"/>
-          </a:xfrm>
-          <a:prstGeom prst="rect">
-            <a:avLst/>
-          </a:prstGeom>
-          <a:noFill/>
+            <a:off x="2606467" y="1809750"/>
+            <a:ext cx="2837471" cy="504825"/>
+          </a:xfrm>
+          <a:prstGeom prst="rightArrow">
+            <a:avLst>
+              <a:gd name="adj1" fmla="val 16038"/>
+              <a:gd name="adj2" fmla="val 50000"/>
+            </a:avLst>
+          </a:prstGeom>
         </p:spPr>
         <p:style>
           <a:lnRef idx="2">
@@ -4258,14 +4355,14 @@
       </p:sp>
       <p:sp>
         <p:nvSpPr>
-          <p:cNvPr id="8" name="ZoneTexte 7"/>
+          <p:cNvPr id="12" name="ZoneTexte 11"/>
           <p:cNvSpPr txBox="1"/>
           <p:nvPr/>
         </p:nvSpPr>
         <p:spPr>
           <a:xfrm>
-            <a:off x="1175875" y="2289800"/>
-            <a:ext cx="1040926" cy="307777"/>
+            <a:off x="3565205" y="1625084"/>
+            <a:ext cx="919995" cy="369332"/>
           </a:xfrm>
           <a:prstGeom prst="rect">
             <a:avLst/>
@@ -4278,286 +4375,18 @@
           </a:bodyPr>
           <a:lstStyle/>
           <a:p>
-            <a:pPr algn="ctr"/>
-            <a:r>
-              <a:rPr lang="fr-FR" sz="1400" b="1" dirty="0" smtClean="0"/>
-              <a:t>  </a:t>
-            </a:r>
-            <a:r>
-              <a:rPr lang="fr-FR" sz="1200" b="1" dirty="0" smtClean="0"/>
-              <a:t>NanoHTTPD</a:t>
-            </a:r>
-            <a:endParaRPr lang="en-US" sz="1400" b="1" dirty="0"/>
-          </a:p>
-        </p:txBody>
-      </p:sp>
-      <p:sp>
-        <p:nvSpPr>
-          <p:cNvPr id="9" name="Rectangle 8"/>
-          <p:cNvSpPr/>
-          <p:nvPr/>
-        </p:nvSpPr>
-        <p:spPr>
-          <a:xfrm>
-            <a:off x="6561634" y="1579926"/>
-            <a:ext cx="975511" cy="737030"/>
-          </a:xfrm>
-          <a:prstGeom prst="rect">
-            <a:avLst/>
-          </a:prstGeom>
-          <a:noFill/>
-        </p:spPr>
-        <p:style>
-          <a:lnRef idx="2">
-            <a:schemeClr val="accent1">
-              <a:shade val="50000"/>
-            </a:schemeClr>
-          </a:lnRef>
-          <a:fillRef idx="1">
-            <a:schemeClr val="accent1"/>
-          </a:fillRef>
-          <a:effectRef idx="0">
-            <a:schemeClr val="accent1"/>
-          </a:effectRef>
-          <a:fontRef idx="minor">
-            <a:schemeClr val="lt1"/>
-          </a:fontRef>
-        </p:style>
-        <p:txBody>
-          <a:bodyPr rtlCol="0" anchor="ctr"/>
-          <a:lstStyle/>
-          <a:p>
-            <a:pPr algn="ctr"/>
-            <a:endParaRPr lang="en-US"/>
-          </a:p>
-        </p:txBody>
-      </p:sp>
-      <p:sp>
-        <p:nvSpPr>
-          <p:cNvPr id="10" name="ZoneTexte 9"/>
-          <p:cNvSpPr txBox="1"/>
-          <p:nvPr/>
-        </p:nvSpPr>
-        <p:spPr>
-          <a:xfrm>
-            <a:off x="6352018" y="2292181"/>
-            <a:ext cx="1394741" cy="276999"/>
-          </a:xfrm>
-          <a:prstGeom prst="rect">
-            <a:avLst/>
-          </a:prstGeom>
-          <a:noFill/>
-        </p:spPr>
-        <p:txBody>
-          <a:bodyPr wrap="none" rtlCol="0">
-            <a:spAutoFit/>
-          </a:bodyPr>
-          <a:lstStyle/>
-          <a:p>
-            <a:r>
-              <a:rPr lang="fr-FR" sz="1200" b="1" dirty="0" smtClean="0"/>
-              <a:t>HttpUrlConnection</a:t>
-            </a:r>
-            <a:endParaRPr lang="en-US" sz="1200" b="1" dirty="0"/>
-          </a:p>
-        </p:txBody>
-      </p:sp>
-      <p:sp>
-        <p:nvSpPr>
-          <p:cNvPr id="11" name="ZoneTexte 10"/>
-          <p:cNvSpPr txBox="1"/>
-          <p:nvPr/>
-        </p:nvSpPr>
-        <p:spPr>
-          <a:xfrm>
-            <a:off x="1013950" y="2939753"/>
-            <a:ext cx="1389163" cy="338554"/>
-          </a:xfrm>
-          <a:prstGeom prst="rect">
-            <a:avLst/>
-          </a:prstGeom>
-          <a:noFill/>
-        </p:spPr>
-        <p:txBody>
-          <a:bodyPr wrap="none" rtlCol="0">
-            <a:spAutoFit/>
-          </a:bodyPr>
-          <a:lstStyle/>
-          <a:p>
-            <a:r>
-              <a:rPr lang="fr-FR" sz="1600" b="1" dirty="0" smtClean="0"/>
-              <a:t>MyHttpServer</a:t>
-            </a:r>
-            <a:endParaRPr lang="en-US" b="1" dirty="0"/>
-          </a:p>
-        </p:txBody>
-      </p:sp>
-      <p:sp>
-        <p:nvSpPr>
-          <p:cNvPr id="12" name="ZoneTexte 11"/>
-          <p:cNvSpPr txBox="1"/>
-          <p:nvPr/>
-        </p:nvSpPr>
-        <p:spPr>
-          <a:xfrm>
-            <a:off x="6139263" y="2902641"/>
-            <a:ext cx="1911485" cy="338554"/>
-          </a:xfrm>
-          <a:prstGeom prst="rect">
-            <a:avLst/>
-          </a:prstGeom>
-          <a:noFill/>
-        </p:spPr>
-        <p:txBody>
-          <a:bodyPr wrap="none" rtlCol="0">
-            <a:spAutoFit/>
-          </a:bodyPr>
-          <a:lstStyle/>
-          <a:p>
-            <a:r>
-              <a:rPr lang="fr-FR" sz="1600" b="1" dirty="0" smtClean="0"/>
-              <a:t>HttpFileDownloader</a:t>
-            </a:r>
-            <a:endParaRPr lang="en-US" sz="1600" b="1" dirty="0"/>
-          </a:p>
-        </p:txBody>
-      </p:sp>
-      <p:cxnSp>
-        <p:nvCxnSpPr>
-          <p:cNvPr id="13" name="Connecteur droit avec flèche 12"/>
-          <p:cNvCxnSpPr/>
-          <p:nvPr/>
-        </p:nvCxnSpPr>
-        <p:spPr>
-          <a:xfrm flipH="1" flipV="1">
-            <a:off x="2606467" y="1333500"/>
-            <a:ext cx="3532796" cy="28575"/>
-          </a:xfrm>
-          <a:prstGeom prst="straightConnector1">
-            <a:avLst/>
-          </a:prstGeom>
-          <a:ln>
-            <a:solidFill>
-              <a:srgbClr val="00B0F0"/>
-            </a:solidFill>
-            <a:tailEnd type="triangle"/>
-          </a:ln>
-        </p:spPr>
-        <p:style>
-          <a:lnRef idx="3">
-            <a:schemeClr val="dk1"/>
-          </a:lnRef>
-          <a:fillRef idx="0">
-            <a:schemeClr val="dk1"/>
-          </a:fillRef>
-          <a:effectRef idx="2">
-            <a:schemeClr val="dk1"/>
-          </a:effectRef>
-          <a:fontRef idx="minor">
-            <a:schemeClr val="tx1"/>
-          </a:fontRef>
-        </p:style>
-      </p:cxnSp>
-      <p:cxnSp>
-        <p:nvCxnSpPr>
-          <p:cNvPr id="15" name="Connecteur droit avec flèche 14"/>
-          <p:cNvCxnSpPr/>
-          <p:nvPr/>
-        </p:nvCxnSpPr>
-        <p:spPr>
-          <a:xfrm>
-            <a:off x="2606463" y="2289800"/>
-            <a:ext cx="3532797" cy="0"/>
-          </a:xfrm>
-          <a:prstGeom prst="straightConnector1">
-            <a:avLst/>
-          </a:prstGeom>
-          <a:ln>
-            <a:solidFill>
-              <a:srgbClr val="00B0F0"/>
-            </a:solidFill>
-            <a:tailEnd type="triangle"/>
-          </a:ln>
-        </p:spPr>
-        <p:style>
-          <a:lnRef idx="3">
-            <a:schemeClr val="dk1"/>
-          </a:lnRef>
-          <a:fillRef idx="0">
-            <a:schemeClr val="dk1"/>
-          </a:fillRef>
-          <a:effectRef idx="2">
-            <a:schemeClr val="dk1"/>
-          </a:effectRef>
-          <a:fontRef idx="minor">
-            <a:schemeClr val="tx1"/>
-          </a:fontRef>
-        </p:style>
-      </p:cxnSp>
-      <p:sp>
-        <p:nvSpPr>
-          <p:cNvPr id="18" name="ZoneTexte 17"/>
-          <p:cNvSpPr txBox="1"/>
-          <p:nvPr/>
-        </p:nvSpPr>
-        <p:spPr>
-          <a:xfrm>
-            <a:off x="3288460" y="1023521"/>
-            <a:ext cx="2015232" cy="307777"/>
-          </a:xfrm>
-          <a:prstGeom prst="rect">
-            <a:avLst/>
-          </a:prstGeom>
-          <a:noFill/>
-        </p:spPr>
-        <p:txBody>
-          <a:bodyPr wrap="none" rtlCol="0">
-            <a:spAutoFit/>
-          </a:bodyPr>
-          <a:lstStyle/>
-          <a:p>
-            <a:r>
-              <a:rPr lang="fr-FR" sz="1400" dirty="0" smtClean="0"/>
-              <a:t>Connect (server IP +port)</a:t>
-            </a:r>
-            <a:endParaRPr lang="en-US" sz="1400" dirty="0"/>
-          </a:p>
-        </p:txBody>
-      </p:sp>
-      <p:sp>
-        <p:nvSpPr>
-          <p:cNvPr id="19" name="ZoneTexte 18"/>
-          <p:cNvSpPr txBox="1"/>
-          <p:nvPr/>
-        </p:nvSpPr>
-        <p:spPr>
-          <a:xfrm>
-            <a:off x="3374477" y="1932303"/>
-            <a:ext cx="1812612" cy="307777"/>
-          </a:xfrm>
-          <a:prstGeom prst="rect">
-            <a:avLst/>
-          </a:prstGeom>
-          <a:noFill/>
-        </p:spPr>
-        <p:txBody>
-          <a:bodyPr wrap="none" rtlCol="0">
-            <a:spAutoFit/>
-          </a:bodyPr>
-          <a:lstStyle/>
-          <a:p>
-            <a:r>
-              <a:rPr lang="fr-FR" sz="1400" dirty="0" smtClean="0"/>
-              <a:t>Download file (file url)</a:t>
-            </a:r>
-            <a:endParaRPr lang="en-US" sz="1400" dirty="0"/>
+            <a:r>
+              <a:rPr lang="fr-FR" dirty="0" smtClean="0"/>
+              <a:t>extends</a:t>
+            </a:r>
+            <a:endParaRPr lang="en-US" dirty="0"/>
           </a:p>
         </p:txBody>
       </p:sp>
     </p:spTree>
     <p:extLst>
       <p:ext uri="{BB962C8B-B14F-4D97-AF65-F5344CB8AC3E}">
-        <p14:creationId xmlns:p14="http://schemas.microsoft.com/office/powerpoint/2010/main" val="103908030"/>
+        <p14:creationId xmlns:p14="http://schemas.microsoft.com/office/powerpoint/2010/main" val="2720011555"/>
       </p:ext>
     </p:extLst>
   </p:cSld>
@@ -4593,7 +4422,7 @@
         <p:spPr>
           <a:xfrm>
             <a:off x="786213" y="957129"/>
-            <a:ext cx="1614087" cy="1643196"/>
+            <a:ext cx="1820254" cy="1982624"/>
           </a:xfrm>
           <a:prstGeom prst="rect">
             <a:avLst/>
@@ -4633,8 +4462,8 @@
         </p:nvSpPr>
         <p:spPr>
           <a:xfrm>
-            <a:off x="1071962" y="1195254"/>
-            <a:ext cx="1042587" cy="833571"/>
+            <a:off x="6139263" y="957129"/>
+            <a:ext cx="1820254" cy="1982624"/>
           </a:xfrm>
           <a:prstGeom prst="rect">
             <a:avLst/>
@@ -4668,49 +4497,14 @@
       </p:sp>
       <p:sp>
         <p:nvSpPr>
-          <p:cNvPr id="6" name="ZoneTexte 5"/>
-          <p:cNvSpPr txBox="1"/>
-          <p:nvPr/>
-        </p:nvSpPr>
-        <p:spPr>
-          <a:xfrm>
-            <a:off x="1071962" y="1959173"/>
-            <a:ext cx="1040926" cy="307777"/>
-          </a:xfrm>
-          <a:prstGeom prst="rect">
-            <a:avLst/>
-          </a:prstGeom>
-          <a:noFill/>
-        </p:spPr>
-        <p:txBody>
-          <a:bodyPr wrap="none" rtlCol="0">
-            <a:spAutoFit/>
-          </a:bodyPr>
-          <a:lstStyle/>
-          <a:p>
-            <a:pPr algn="ctr"/>
-            <a:r>
-              <a:rPr lang="fr-FR" sz="1400" b="1" dirty="0" smtClean="0"/>
-              <a:t>  </a:t>
-            </a:r>
-            <a:r>
-              <a:rPr lang="fr-FR" sz="1200" b="1" dirty="0" smtClean="0"/>
-              <a:t>NanoHTTPD</a:t>
-            </a:r>
-            <a:endParaRPr lang="en-US" sz="1400" b="1" dirty="0"/>
-          </a:p>
-        </p:txBody>
-      </p:sp>
-      <p:sp>
-        <p:nvSpPr>
-          <p:cNvPr id="7" name="Rectangle 6"/>
+          <p:cNvPr id="6" name="Rectangle 5"/>
           <p:cNvSpPr/>
           <p:nvPr/>
         </p:nvSpPr>
         <p:spPr>
           <a:xfrm>
-            <a:off x="5462988" y="957129"/>
-            <a:ext cx="1614087" cy="1643196"/>
+            <a:off x="1208584" y="1579926"/>
+            <a:ext cx="975511" cy="737030"/>
           </a:xfrm>
           <a:prstGeom prst="rect">
             <a:avLst/>
@@ -4744,14 +4538,49 @@
       </p:sp>
       <p:sp>
         <p:nvSpPr>
-          <p:cNvPr id="8" name="Rectangle 7"/>
+          <p:cNvPr id="8" name="ZoneTexte 7"/>
+          <p:cNvSpPr txBox="1"/>
+          <p:nvPr/>
+        </p:nvSpPr>
+        <p:spPr>
+          <a:xfrm>
+            <a:off x="1175875" y="2289800"/>
+            <a:ext cx="1040926" cy="307777"/>
+          </a:xfrm>
+          <a:prstGeom prst="rect">
+            <a:avLst/>
+          </a:prstGeom>
+          <a:noFill/>
+        </p:spPr>
+        <p:txBody>
+          <a:bodyPr wrap="none" rtlCol="0">
+            <a:spAutoFit/>
+          </a:bodyPr>
+          <a:lstStyle/>
+          <a:p>
+            <a:pPr algn="ctr"/>
+            <a:r>
+              <a:rPr lang="fr-FR" sz="1400" b="1" dirty="0" smtClean="0"/>
+              <a:t>  </a:t>
+            </a:r>
+            <a:r>
+              <a:rPr lang="fr-FR" sz="1200" b="1" dirty="0" smtClean="0"/>
+              <a:t>NanoHTTPD</a:t>
+            </a:r>
+            <a:endParaRPr lang="en-US" sz="1400" b="1" dirty="0"/>
+          </a:p>
+        </p:txBody>
+      </p:sp>
+      <p:sp>
+        <p:nvSpPr>
+          <p:cNvPr id="9" name="Rectangle 8"/>
           <p:cNvSpPr/>
           <p:nvPr/>
         </p:nvSpPr>
         <p:spPr>
           <a:xfrm>
-            <a:off x="5748737" y="1195254"/>
-            <a:ext cx="1042587" cy="833571"/>
+            <a:off x="6561634" y="1579926"/>
+            <a:ext cx="975511" cy="737030"/>
           </a:xfrm>
           <a:prstGeom prst="rect">
             <a:avLst/>
@@ -4785,14 +4614,14 @@
       </p:sp>
       <p:sp>
         <p:nvSpPr>
-          <p:cNvPr id="9" name="ZoneTexte 8"/>
+          <p:cNvPr id="10" name="ZoneTexte 9"/>
           <p:cNvSpPr txBox="1"/>
           <p:nvPr/>
         </p:nvSpPr>
         <p:spPr>
           <a:xfrm>
-            <a:off x="5748737" y="1959173"/>
-            <a:ext cx="1040926" cy="307777"/>
+            <a:off x="6352018" y="2292181"/>
+            <a:ext cx="1394741" cy="276999"/>
           </a:xfrm>
           <a:prstGeom prst="rect">
             <a:avLst/>
@@ -4805,28 +4634,341 @@
           </a:bodyPr>
           <a:lstStyle/>
           <a:p>
-            <a:pPr algn="ctr"/>
-            <a:r>
-              <a:rPr lang="fr-FR" sz="1400" b="1" dirty="0" smtClean="0"/>
-              <a:t>  </a:t>
-            </a:r>
             <a:r>
               <a:rPr lang="fr-FR" sz="1200" b="1" dirty="0" smtClean="0"/>
-              <a:t>NanoHTTPD</a:t>
-            </a:r>
-            <a:endParaRPr lang="en-US" sz="1400" b="1" dirty="0"/>
-          </a:p>
-        </p:txBody>
-      </p:sp>
-      <p:sp>
-        <p:nvSpPr>
-          <p:cNvPr id="10" name="Rectangle 9"/>
+              <a:t>HttpUrlConnection</a:t>
+            </a:r>
+            <a:endParaRPr lang="en-US" sz="1200" b="1" dirty="0"/>
+          </a:p>
+        </p:txBody>
+      </p:sp>
+      <p:sp>
+        <p:nvSpPr>
+          <p:cNvPr id="11" name="ZoneTexte 10"/>
+          <p:cNvSpPr txBox="1"/>
+          <p:nvPr/>
+        </p:nvSpPr>
+        <p:spPr>
+          <a:xfrm>
+            <a:off x="1013950" y="2939753"/>
+            <a:ext cx="1389163" cy="338554"/>
+          </a:xfrm>
+          <a:prstGeom prst="rect">
+            <a:avLst/>
+          </a:prstGeom>
+          <a:noFill/>
+        </p:spPr>
+        <p:txBody>
+          <a:bodyPr wrap="none" rtlCol="0">
+            <a:spAutoFit/>
+          </a:bodyPr>
+          <a:lstStyle/>
+          <a:p>
+            <a:r>
+              <a:rPr lang="fr-FR" sz="1600" b="1" dirty="0" smtClean="0"/>
+              <a:t>MyHttpServer</a:t>
+            </a:r>
+            <a:endParaRPr lang="en-US" b="1" dirty="0"/>
+          </a:p>
+        </p:txBody>
+      </p:sp>
+      <p:sp>
+        <p:nvSpPr>
+          <p:cNvPr id="12" name="ZoneTexte 11"/>
+          <p:cNvSpPr txBox="1"/>
+          <p:nvPr/>
+        </p:nvSpPr>
+        <p:spPr>
+          <a:xfrm>
+            <a:off x="6139263" y="2902641"/>
+            <a:ext cx="1911485" cy="338554"/>
+          </a:xfrm>
+          <a:prstGeom prst="rect">
+            <a:avLst/>
+          </a:prstGeom>
+          <a:noFill/>
+        </p:spPr>
+        <p:txBody>
+          <a:bodyPr wrap="none" rtlCol="0">
+            <a:spAutoFit/>
+          </a:bodyPr>
+          <a:lstStyle/>
+          <a:p>
+            <a:r>
+              <a:rPr lang="fr-FR" sz="1600" b="1" dirty="0" smtClean="0"/>
+              <a:t>HttpFileDownloader</a:t>
+            </a:r>
+            <a:endParaRPr lang="en-US" sz="1600" b="1" dirty="0"/>
+          </a:p>
+        </p:txBody>
+      </p:sp>
+      <p:cxnSp>
+        <p:nvCxnSpPr>
+          <p:cNvPr id="13" name="Connecteur droit avec flèche 12"/>
+          <p:cNvCxnSpPr/>
+          <p:nvPr/>
+        </p:nvCxnSpPr>
+        <p:spPr>
+          <a:xfrm flipH="1" flipV="1">
+            <a:off x="2606467" y="1333500"/>
+            <a:ext cx="3532796" cy="28575"/>
+          </a:xfrm>
+          <a:prstGeom prst="straightConnector1">
+            <a:avLst/>
+          </a:prstGeom>
+          <a:ln>
+            <a:solidFill>
+              <a:srgbClr val="00B0F0"/>
+            </a:solidFill>
+            <a:tailEnd type="triangle"/>
+          </a:ln>
+        </p:spPr>
+        <p:style>
+          <a:lnRef idx="3">
+            <a:schemeClr val="dk1"/>
+          </a:lnRef>
+          <a:fillRef idx="0">
+            <a:schemeClr val="dk1"/>
+          </a:fillRef>
+          <a:effectRef idx="2">
+            <a:schemeClr val="dk1"/>
+          </a:effectRef>
+          <a:fontRef idx="minor">
+            <a:schemeClr val="tx1"/>
+          </a:fontRef>
+        </p:style>
+      </p:cxnSp>
+      <p:cxnSp>
+        <p:nvCxnSpPr>
+          <p:cNvPr id="15" name="Connecteur droit avec flèche 14"/>
+          <p:cNvCxnSpPr/>
+          <p:nvPr/>
+        </p:nvCxnSpPr>
+        <p:spPr>
+          <a:xfrm>
+            <a:off x="2619921" y="2082199"/>
+            <a:ext cx="3532797" cy="0"/>
+          </a:xfrm>
+          <a:prstGeom prst="straightConnector1">
+            <a:avLst/>
+          </a:prstGeom>
+          <a:ln>
+            <a:solidFill>
+              <a:srgbClr val="00B0F0"/>
+            </a:solidFill>
+            <a:tailEnd type="triangle"/>
+          </a:ln>
+        </p:spPr>
+        <p:style>
+          <a:lnRef idx="3">
+            <a:schemeClr val="dk1"/>
+          </a:lnRef>
+          <a:fillRef idx="0">
+            <a:schemeClr val="dk1"/>
+          </a:fillRef>
+          <a:effectRef idx="2">
+            <a:schemeClr val="dk1"/>
+          </a:effectRef>
+          <a:fontRef idx="minor">
+            <a:schemeClr val="tx1"/>
+          </a:fontRef>
+        </p:style>
+      </p:cxnSp>
+      <p:sp>
+        <p:nvSpPr>
+          <p:cNvPr id="18" name="ZoneTexte 17"/>
+          <p:cNvSpPr txBox="1"/>
+          <p:nvPr/>
+        </p:nvSpPr>
+        <p:spPr>
+          <a:xfrm>
+            <a:off x="3288460" y="1023521"/>
+            <a:ext cx="2015232" cy="307777"/>
+          </a:xfrm>
+          <a:prstGeom prst="rect">
+            <a:avLst/>
+          </a:prstGeom>
+          <a:noFill/>
+        </p:spPr>
+        <p:txBody>
+          <a:bodyPr wrap="none" rtlCol="0">
+            <a:spAutoFit/>
+          </a:bodyPr>
+          <a:lstStyle/>
+          <a:p>
+            <a:r>
+              <a:rPr lang="fr-FR" sz="1400" dirty="0" smtClean="0"/>
+              <a:t>Connect (server IP +port)</a:t>
+            </a:r>
+            <a:endParaRPr lang="en-US" sz="1400" dirty="0"/>
+          </a:p>
+        </p:txBody>
+      </p:sp>
+      <p:sp>
+        <p:nvSpPr>
+          <p:cNvPr id="19" name="ZoneTexte 18"/>
+          <p:cNvSpPr txBox="1"/>
+          <p:nvPr/>
+        </p:nvSpPr>
+        <p:spPr>
+          <a:xfrm>
+            <a:off x="3373269" y="2097449"/>
+            <a:ext cx="1812612" cy="307777"/>
+          </a:xfrm>
+          <a:prstGeom prst="rect">
+            <a:avLst/>
+          </a:prstGeom>
+          <a:noFill/>
+        </p:spPr>
+        <p:txBody>
+          <a:bodyPr wrap="none" rtlCol="0">
+            <a:spAutoFit/>
+          </a:bodyPr>
+          <a:lstStyle/>
+          <a:p>
+            <a:r>
+              <a:rPr lang="fr-FR" sz="1400" dirty="0" smtClean="0"/>
+              <a:t>Download file (file url)</a:t>
+            </a:r>
+            <a:endParaRPr lang="en-US" sz="1400" dirty="0"/>
+          </a:p>
+        </p:txBody>
+      </p:sp>
+      <p:sp>
+        <p:nvSpPr>
+          <p:cNvPr id="2" name="ZoneTexte 1"/>
+          <p:cNvSpPr txBox="1"/>
+          <p:nvPr/>
+        </p:nvSpPr>
+        <p:spPr>
+          <a:xfrm>
+            <a:off x="4125997" y="507575"/>
+            <a:ext cx="340158" cy="461665"/>
+          </a:xfrm>
+          <a:prstGeom prst="rect">
+            <a:avLst/>
+          </a:prstGeom>
+          <a:noFill/>
+        </p:spPr>
+        <p:txBody>
+          <a:bodyPr wrap="none" rtlCol="0">
+            <a:spAutoFit/>
+          </a:bodyPr>
+          <a:lstStyle/>
+          <a:p>
+            <a:r>
+              <a:rPr lang="fr-FR" sz="2400" dirty="0" smtClean="0"/>
+              <a:t>1</a:t>
+            </a:r>
+            <a:endParaRPr lang="en-US" dirty="0"/>
+          </a:p>
+        </p:txBody>
+      </p:sp>
+      <p:cxnSp>
+        <p:nvCxnSpPr>
+          <p:cNvPr id="16" name="Connecteur droit avec flèche 15"/>
+          <p:cNvCxnSpPr/>
+          <p:nvPr/>
+        </p:nvCxnSpPr>
+        <p:spPr>
+          <a:xfrm flipH="1" flipV="1">
+            <a:off x="2606463" y="2469742"/>
+            <a:ext cx="3532797" cy="27559"/>
+          </a:xfrm>
+          <a:prstGeom prst="straightConnector1">
+            <a:avLst/>
+          </a:prstGeom>
+          <a:ln>
+            <a:solidFill>
+              <a:srgbClr val="00B0F0"/>
+            </a:solidFill>
+            <a:tailEnd type="triangle"/>
+          </a:ln>
+        </p:spPr>
+        <p:style>
+          <a:lnRef idx="3">
+            <a:schemeClr val="dk1"/>
+          </a:lnRef>
+          <a:fillRef idx="0">
+            <a:schemeClr val="dk1"/>
+          </a:fillRef>
+          <a:effectRef idx="2">
+            <a:schemeClr val="dk1"/>
+          </a:effectRef>
+          <a:fontRef idx="minor">
+            <a:schemeClr val="tx1"/>
+          </a:fontRef>
+        </p:style>
+      </p:cxnSp>
+      <p:sp>
+        <p:nvSpPr>
+          <p:cNvPr id="20" name="ZoneTexte 19"/>
+          <p:cNvSpPr txBox="1"/>
+          <p:nvPr/>
+        </p:nvSpPr>
+        <p:spPr>
+          <a:xfrm>
+            <a:off x="4101109" y="2643855"/>
+            <a:ext cx="340158" cy="461665"/>
+          </a:xfrm>
+          <a:prstGeom prst="rect">
+            <a:avLst/>
+          </a:prstGeom>
+          <a:noFill/>
+        </p:spPr>
+        <p:txBody>
+          <a:bodyPr wrap="none" rtlCol="0">
+            <a:spAutoFit/>
+          </a:bodyPr>
+          <a:lstStyle/>
+          <a:p>
+            <a:r>
+              <a:rPr lang="fr-FR" sz="2400" dirty="0" smtClean="0"/>
+              <a:t>2</a:t>
+            </a:r>
+            <a:endParaRPr lang="en-US" dirty="0"/>
+          </a:p>
+        </p:txBody>
+      </p:sp>
+    </p:spTree>
+    <p:extLst>
+      <p:ext uri="{BB962C8B-B14F-4D97-AF65-F5344CB8AC3E}">
+        <p14:creationId xmlns:p14="http://schemas.microsoft.com/office/powerpoint/2010/main" val="103908030"/>
+      </p:ext>
+    </p:extLst>
+  </p:cSld>
+  <p:clrMapOvr>
+    <a:masterClrMapping/>
+  </p:clrMapOvr>
+</p:sld>
+</file>
+
+<file path=ppt/slides/slide5.xml><?xml version="1.0" encoding="utf-8"?>
+<p:sld xmlns:a="http://schemas.openxmlformats.org/drawingml/2006/main" xmlns:r="http://schemas.openxmlformats.org/officeDocument/2006/relationships" xmlns:p="http://schemas.openxmlformats.org/presentationml/2006/main">
+  <p:cSld>
+    <p:spTree>
+      <p:nvGrpSpPr>
+        <p:cNvPr id="1" name=""/>
+        <p:cNvGrpSpPr/>
+        <p:nvPr/>
+      </p:nvGrpSpPr>
+      <p:grpSpPr>
+        <a:xfrm>
+          <a:off x="0" y="0"/>
+          <a:ext cx="0" cy="0"/>
+          <a:chOff x="0" y="0"/>
+          <a:chExt cx="0" cy="0"/>
+        </a:xfrm>
+      </p:grpSpPr>
+      <p:sp>
+        <p:nvSpPr>
+          <p:cNvPr id="4" name="Rectangle 3"/>
           <p:cNvSpPr/>
           <p:nvPr/>
         </p:nvSpPr>
         <p:spPr>
           <a:xfrm>
-            <a:off x="5462988" y="3974649"/>
+            <a:off x="786213" y="957129"/>
             <a:ext cx="1614087" cy="1643196"/>
           </a:xfrm>
           <a:prstGeom prst="rect">
@@ -4861,13 +5003,13 @@
       </p:sp>
       <p:sp>
         <p:nvSpPr>
-          <p:cNvPr id="11" name="Rectangle 10"/>
+          <p:cNvPr id="5" name="Rectangle 4"/>
           <p:cNvSpPr/>
           <p:nvPr/>
         </p:nvSpPr>
         <p:spPr>
           <a:xfrm>
-            <a:off x="5748737" y="4212774"/>
+            <a:off x="1071962" y="1195254"/>
             <a:ext cx="1042587" cy="833571"/>
           </a:xfrm>
           <a:prstGeom prst="rect">
@@ -4902,13 +5044,13 @@
       </p:sp>
       <p:sp>
         <p:nvSpPr>
-          <p:cNvPr id="12" name="ZoneTexte 11"/>
+          <p:cNvPr id="6" name="ZoneTexte 5"/>
           <p:cNvSpPr txBox="1"/>
           <p:nvPr/>
         </p:nvSpPr>
         <p:spPr>
           <a:xfrm>
-            <a:off x="5748737" y="4976693"/>
+            <a:off x="1071962" y="1959173"/>
             <a:ext cx="1040926" cy="307777"/>
           </a:xfrm>
           <a:prstGeom prst="rect">
@@ -4930,6 +5072,240 @@
             <a:r>
               <a:rPr lang="fr-FR" sz="1200" b="1" dirty="0" smtClean="0"/>
               <a:t>NanoHTTPD</a:t>
+            </a:r>
+            <a:endParaRPr lang="en-US" sz="1400" b="1" dirty="0"/>
+          </a:p>
+        </p:txBody>
+      </p:sp>
+      <p:sp>
+        <p:nvSpPr>
+          <p:cNvPr id="7" name="Rectangle 6"/>
+          <p:cNvSpPr/>
+          <p:nvPr/>
+        </p:nvSpPr>
+        <p:spPr>
+          <a:xfrm>
+            <a:off x="5462988" y="957129"/>
+            <a:ext cx="1614087" cy="1643196"/>
+          </a:xfrm>
+          <a:prstGeom prst="rect">
+            <a:avLst/>
+          </a:prstGeom>
+          <a:noFill/>
+        </p:spPr>
+        <p:style>
+          <a:lnRef idx="2">
+            <a:schemeClr val="accent1">
+              <a:shade val="50000"/>
+            </a:schemeClr>
+          </a:lnRef>
+          <a:fillRef idx="1">
+            <a:schemeClr val="accent1"/>
+          </a:fillRef>
+          <a:effectRef idx="0">
+            <a:schemeClr val="accent1"/>
+          </a:effectRef>
+          <a:fontRef idx="minor">
+            <a:schemeClr val="lt1"/>
+          </a:fontRef>
+        </p:style>
+        <p:txBody>
+          <a:bodyPr rtlCol="0" anchor="ctr"/>
+          <a:lstStyle/>
+          <a:p>
+            <a:pPr algn="ctr"/>
+            <a:endParaRPr lang="en-US"/>
+          </a:p>
+        </p:txBody>
+      </p:sp>
+      <p:sp>
+        <p:nvSpPr>
+          <p:cNvPr id="8" name="Rectangle 7"/>
+          <p:cNvSpPr/>
+          <p:nvPr/>
+        </p:nvSpPr>
+        <p:spPr>
+          <a:xfrm>
+            <a:off x="5748737" y="1195254"/>
+            <a:ext cx="1042587" cy="833571"/>
+          </a:xfrm>
+          <a:prstGeom prst="rect">
+            <a:avLst/>
+          </a:prstGeom>
+          <a:noFill/>
+        </p:spPr>
+        <p:style>
+          <a:lnRef idx="2">
+            <a:schemeClr val="accent1">
+              <a:shade val="50000"/>
+            </a:schemeClr>
+          </a:lnRef>
+          <a:fillRef idx="1">
+            <a:schemeClr val="accent1"/>
+          </a:fillRef>
+          <a:effectRef idx="0">
+            <a:schemeClr val="accent1"/>
+          </a:effectRef>
+          <a:fontRef idx="minor">
+            <a:schemeClr val="lt1"/>
+          </a:fontRef>
+        </p:style>
+        <p:txBody>
+          <a:bodyPr rtlCol="0" anchor="ctr"/>
+          <a:lstStyle/>
+          <a:p>
+            <a:pPr algn="ctr"/>
+            <a:endParaRPr lang="en-US"/>
+          </a:p>
+        </p:txBody>
+      </p:sp>
+      <p:sp>
+        <p:nvSpPr>
+          <p:cNvPr id="9" name="ZoneTexte 8"/>
+          <p:cNvSpPr txBox="1"/>
+          <p:nvPr/>
+        </p:nvSpPr>
+        <p:spPr>
+          <a:xfrm>
+            <a:off x="5748737" y="1959173"/>
+            <a:ext cx="1040926" cy="307777"/>
+          </a:xfrm>
+          <a:prstGeom prst="rect">
+            <a:avLst/>
+          </a:prstGeom>
+          <a:noFill/>
+        </p:spPr>
+        <p:txBody>
+          <a:bodyPr wrap="none" rtlCol="0">
+            <a:spAutoFit/>
+          </a:bodyPr>
+          <a:lstStyle/>
+          <a:p>
+            <a:pPr algn="ctr"/>
+            <a:r>
+              <a:rPr lang="fr-FR" sz="1400" b="1" dirty="0" smtClean="0"/>
+              <a:t>  </a:t>
+            </a:r>
+            <a:r>
+              <a:rPr lang="fr-FR" sz="1200" b="1" dirty="0" smtClean="0"/>
+              <a:t>NanoHTTPD</a:t>
+            </a:r>
+            <a:endParaRPr lang="en-US" sz="1400" b="1" dirty="0"/>
+          </a:p>
+        </p:txBody>
+      </p:sp>
+      <p:sp>
+        <p:nvSpPr>
+          <p:cNvPr id="10" name="Rectangle 9"/>
+          <p:cNvSpPr/>
+          <p:nvPr/>
+        </p:nvSpPr>
+        <p:spPr>
+          <a:xfrm>
+            <a:off x="5462988" y="3974649"/>
+            <a:ext cx="1614087" cy="1643196"/>
+          </a:xfrm>
+          <a:prstGeom prst="rect">
+            <a:avLst/>
+          </a:prstGeom>
+          <a:noFill/>
+        </p:spPr>
+        <p:style>
+          <a:lnRef idx="2">
+            <a:schemeClr val="accent1">
+              <a:shade val="50000"/>
+            </a:schemeClr>
+          </a:lnRef>
+          <a:fillRef idx="1">
+            <a:schemeClr val="accent1"/>
+          </a:fillRef>
+          <a:effectRef idx="0">
+            <a:schemeClr val="accent1"/>
+          </a:effectRef>
+          <a:fontRef idx="minor">
+            <a:schemeClr val="lt1"/>
+          </a:fontRef>
+        </p:style>
+        <p:txBody>
+          <a:bodyPr rtlCol="0" anchor="ctr"/>
+          <a:lstStyle/>
+          <a:p>
+            <a:pPr algn="ctr"/>
+            <a:endParaRPr lang="en-US"/>
+          </a:p>
+        </p:txBody>
+      </p:sp>
+      <p:sp>
+        <p:nvSpPr>
+          <p:cNvPr id="11" name="Rectangle 10"/>
+          <p:cNvSpPr/>
+          <p:nvPr/>
+        </p:nvSpPr>
+        <p:spPr>
+          <a:xfrm>
+            <a:off x="5748737" y="4212774"/>
+            <a:ext cx="1042587" cy="833571"/>
+          </a:xfrm>
+          <a:prstGeom prst="rect">
+            <a:avLst/>
+          </a:prstGeom>
+          <a:noFill/>
+        </p:spPr>
+        <p:style>
+          <a:lnRef idx="2">
+            <a:schemeClr val="accent1">
+              <a:shade val="50000"/>
+            </a:schemeClr>
+          </a:lnRef>
+          <a:fillRef idx="1">
+            <a:schemeClr val="accent1"/>
+          </a:fillRef>
+          <a:effectRef idx="0">
+            <a:schemeClr val="accent1"/>
+          </a:effectRef>
+          <a:fontRef idx="minor">
+            <a:schemeClr val="lt1"/>
+          </a:fontRef>
+        </p:style>
+        <p:txBody>
+          <a:bodyPr rtlCol="0" anchor="ctr"/>
+          <a:lstStyle/>
+          <a:p>
+            <a:pPr algn="ctr"/>
+            <a:endParaRPr lang="en-US"/>
+          </a:p>
+        </p:txBody>
+      </p:sp>
+      <p:sp>
+        <p:nvSpPr>
+          <p:cNvPr id="12" name="ZoneTexte 11"/>
+          <p:cNvSpPr txBox="1"/>
+          <p:nvPr/>
+        </p:nvSpPr>
+        <p:spPr>
+          <a:xfrm>
+            <a:off x="5531757" y="4976693"/>
+            <a:ext cx="1474891" cy="307777"/>
+          </a:xfrm>
+          <a:prstGeom prst="rect">
+            <a:avLst/>
+          </a:prstGeom>
+          <a:noFill/>
+        </p:spPr>
+        <p:txBody>
+          <a:bodyPr wrap="none" rtlCol="0">
+            <a:spAutoFit/>
+          </a:bodyPr>
+          <a:lstStyle/>
+          <a:p>
+            <a:pPr algn="ctr"/>
+            <a:r>
+              <a:rPr lang="fr-FR" sz="1400" b="1" dirty="0" smtClean="0"/>
+              <a:t>  </a:t>
+            </a:r>
+            <a:r>
+              <a:rPr lang="fr-FR" sz="1200" b="1" dirty="0" smtClean="0"/>
+              <a:t>HttpUrlConnection</a:t>
             </a:r>
             <a:endParaRPr lang="en-US" sz="1400" b="1" dirty="0"/>
           </a:p>
@@ -5132,8 +5508,8 @@
         </p:nvSpPr>
         <p:spPr>
           <a:xfrm rot="1861750">
-            <a:off x="2304581" y="3961507"/>
-            <a:ext cx="1925784" cy="307777"/>
+            <a:off x="2466697" y="3688971"/>
+            <a:ext cx="2095702" cy="307777"/>
           </a:xfrm>
           <a:prstGeom prst="rect">
             <a:avLst/>
@@ -5148,7 +5524,15 @@
           <a:p>
             <a:r>
               <a:rPr lang="en-US" sz="1400" dirty="0" smtClean="0"/>
-              <a:t>Download Data (file url)</a:t>
+              <a:t>Download Data </a:t>
+            </a:r>
+            <a:r>
+              <a:rPr lang="en-US" sz="1400" dirty="0" smtClean="0"/>
+              <a:t>( + file </a:t>
+            </a:r>
+            <a:r>
+              <a:rPr lang="en-US" sz="1400" dirty="0" smtClean="0"/>
+              <a:t>url)</a:t>
             </a:r>
             <a:endParaRPr lang="en-US" sz="1400" dirty="0"/>
           </a:p>
@@ -5282,8 +5666,8 @@
         </p:nvSpPr>
         <p:spPr>
           <a:xfrm rot="1638267">
-            <a:off x="2996874" y="3249458"/>
-            <a:ext cx="2267993" cy="307777"/>
+            <a:off x="2911916" y="3249458"/>
+            <a:ext cx="2437911" cy="307777"/>
           </a:xfrm>
           <a:prstGeom prst="rect">
             <a:avLst/>
@@ -5298,9 +5682,167 @@
           <a:p>
             <a:r>
               <a:rPr lang="en-US" sz="1400" dirty="0" smtClean="0"/>
-              <a:t>Transfer progress (file name)</a:t>
+              <a:t>Transfer progress </a:t>
+            </a:r>
+            <a:r>
+              <a:rPr lang="en-US" sz="1400" dirty="0" smtClean="0"/>
+              <a:t>( + file </a:t>
+            </a:r>
+            <a:r>
+              <a:rPr lang="en-US" sz="1400" dirty="0" smtClean="0"/>
+              <a:t>name)</a:t>
             </a:r>
             <a:endParaRPr lang="en-US" sz="1400" dirty="0"/>
+          </a:p>
+        </p:txBody>
+      </p:sp>
+      <p:sp>
+        <p:nvSpPr>
+          <p:cNvPr id="3" name="ZoneTexte 2"/>
+          <p:cNvSpPr txBox="1"/>
+          <p:nvPr/>
+        </p:nvSpPr>
+        <p:spPr>
+          <a:xfrm>
+            <a:off x="1847850" y="6400800"/>
+            <a:ext cx="4131516" cy="369332"/>
+          </a:xfrm>
+          <a:prstGeom prst="rect">
+            <a:avLst/>
+          </a:prstGeom>
+          <a:noFill/>
+        </p:spPr>
+        <p:txBody>
+          <a:bodyPr wrap="none" rtlCol="0">
+            <a:spAutoFit/>
+          </a:bodyPr>
+          <a:lstStyle/>
+          <a:p>
+            <a:r>
+              <a:rPr lang="fr-FR" dirty="0" smtClean="0"/>
+              <a:t>Mécanisme de téléversement d’un fichier </a:t>
+            </a:r>
+            <a:endParaRPr lang="en-US" dirty="0"/>
+          </a:p>
+        </p:txBody>
+      </p:sp>
+      <p:sp>
+        <p:nvSpPr>
+          <p:cNvPr id="14" name="ZoneTexte 13"/>
+          <p:cNvSpPr txBox="1"/>
+          <p:nvPr/>
+        </p:nvSpPr>
+        <p:spPr>
+          <a:xfrm>
+            <a:off x="3646699" y="800219"/>
+            <a:ext cx="314510" cy="400110"/>
+          </a:xfrm>
+          <a:prstGeom prst="rect">
+            <a:avLst/>
+          </a:prstGeom>
+          <a:noFill/>
+        </p:spPr>
+        <p:txBody>
+          <a:bodyPr wrap="none" rtlCol="0">
+            <a:spAutoFit/>
+          </a:bodyPr>
+          <a:lstStyle/>
+          <a:p>
+            <a:r>
+              <a:rPr lang="fr-FR" sz="2000" dirty="0" smtClean="0"/>
+              <a:t>1</a:t>
+            </a:r>
+            <a:endParaRPr lang="en-US" sz="2000" dirty="0"/>
+          </a:p>
+        </p:txBody>
+      </p:sp>
+      <p:sp>
+        <p:nvSpPr>
+          <p:cNvPr id="25" name="ZoneTexte 24"/>
+          <p:cNvSpPr txBox="1"/>
+          <p:nvPr/>
+        </p:nvSpPr>
+        <p:spPr>
+          <a:xfrm>
+            <a:off x="6704962" y="3222485"/>
+            <a:ext cx="340158" cy="461665"/>
+          </a:xfrm>
+          <a:prstGeom prst="rect">
+            <a:avLst/>
+          </a:prstGeom>
+          <a:noFill/>
+        </p:spPr>
+        <p:txBody>
+          <a:bodyPr wrap="none" rtlCol="0">
+            <a:spAutoFit/>
+          </a:bodyPr>
+          <a:lstStyle/>
+          <a:p>
+            <a:r>
+              <a:rPr lang="fr-FR" sz="2400" dirty="0"/>
+              <a:t>2</a:t>
+            </a:r>
+            <a:endParaRPr lang="en-US" sz="2400" dirty="0"/>
+          </a:p>
+        </p:txBody>
+      </p:sp>
+      <p:sp>
+        <p:nvSpPr>
+          <p:cNvPr id="15" name="ZoneTexte 14"/>
+          <p:cNvSpPr txBox="1"/>
+          <p:nvPr/>
+        </p:nvSpPr>
+        <p:spPr>
+          <a:xfrm>
+            <a:off x="5521728" y="2836994"/>
+            <a:ext cx="2054345" cy="307777"/>
+          </a:xfrm>
+          <a:prstGeom prst="rect">
+            <a:avLst/>
+          </a:prstGeom>
+          <a:noFill/>
+        </p:spPr>
+        <p:txBody>
+          <a:bodyPr wrap="none" rtlCol="0">
+            <a:spAutoFit/>
+          </a:bodyPr>
+          <a:lstStyle/>
+          <a:p>
+            <a:r>
+              <a:rPr lang="fr-FR" sz="1400" dirty="0" smtClean="0"/>
+              <a:t>Instanciation du uploader</a:t>
+            </a:r>
+            <a:endParaRPr lang="en-US" sz="1400" dirty="0"/>
+          </a:p>
+        </p:txBody>
+      </p:sp>
+      <p:sp>
+        <p:nvSpPr>
+          <p:cNvPr id="28" name="ZoneTexte 27"/>
+          <p:cNvSpPr txBox="1"/>
+          <p:nvPr/>
+        </p:nvSpPr>
+        <p:spPr>
+          <a:xfrm>
+            <a:off x="2675452" y="4222718"/>
+            <a:ext cx="367408" cy="523220"/>
+          </a:xfrm>
+          <a:prstGeom prst="rect">
+            <a:avLst/>
+          </a:prstGeom>
+          <a:noFill/>
+        </p:spPr>
+        <p:txBody>
+          <a:bodyPr wrap="none" rtlCol="0">
+            <a:spAutoFit/>
+          </a:bodyPr>
+          <a:lstStyle/>
+          <a:p>
+            <a:r>
+              <a:rPr lang="fr-FR" sz="2800" dirty="0" smtClean="0"/>
+              <a:t>3</a:t>
+            </a:r>
+            <a:endParaRPr lang="en-US" sz="2800" dirty="0"/>
           </a:p>
         </p:txBody>
       </p:sp>
@@ -5308,6 +5850,799 @@
     <p:extLst>
       <p:ext uri="{BB962C8B-B14F-4D97-AF65-F5344CB8AC3E}">
         <p14:creationId xmlns:p14="http://schemas.microsoft.com/office/powerpoint/2010/main" val="3139217030"/>
+      </p:ext>
+    </p:extLst>
+  </p:cSld>
+  <p:clrMapOvr>
+    <a:masterClrMapping/>
+  </p:clrMapOvr>
+</p:sld>
+</file>
+
+<file path=ppt/slides/slide6.xml><?xml version="1.0" encoding="utf-8"?>
+<p:sld xmlns:a="http://schemas.openxmlformats.org/drawingml/2006/main" xmlns:r="http://schemas.openxmlformats.org/officeDocument/2006/relationships" xmlns:p="http://schemas.openxmlformats.org/presentationml/2006/main">
+  <p:cSld>
+    <p:spTree>
+      <p:nvGrpSpPr>
+        <p:cNvPr id="1" name=""/>
+        <p:cNvGrpSpPr/>
+        <p:nvPr/>
+      </p:nvGrpSpPr>
+      <p:grpSpPr>
+        <a:xfrm>
+          <a:off x="0" y="0"/>
+          <a:ext cx="0" cy="0"/>
+          <a:chOff x="0" y="0"/>
+          <a:chExt cx="0" cy="0"/>
+        </a:xfrm>
+      </p:grpSpPr>
+      <p:sp>
+        <p:nvSpPr>
+          <p:cNvPr id="4" name="Rectangle 3"/>
+          <p:cNvSpPr/>
+          <p:nvPr/>
+        </p:nvSpPr>
+        <p:spPr>
+          <a:xfrm>
+            <a:off x="1076325" y="504825"/>
+            <a:ext cx="9839325" cy="4619626"/>
+          </a:xfrm>
+          <a:prstGeom prst="rect">
+            <a:avLst/>
+          </a:prstGeom>
+          <a:noFill/>
+        </p:spPr>
+        <p:style>
+          <a:lnRef idx="2">
+            <a:schemeClr val="accent1">
+              <a:shade val="50000"/>
+            </a:schemeClr>
+          </a:lnRef>
+          <a:fillRef idx="1">
+            <a:schemeClr val="accent1"/>
+          </a:fillRef>
+          <a:effectRef idx="0">
+            <a:schemeClr val="accent1"/>
+          </a:effectRef>
+          <a:fontRef idx="minor">
+            <a:schemeClr val="lt1"/>
+          </a:fontRef>
+        </p:style>
+        <p:txBody>
+          <a:bodyPr rtlCol="0" anchor="ctr"/>
+          <a:lstStyle/>
+          <a:p>
+            <a:pPr algn="ctr"/>
+            <a:endParaRPr lang="en-US"/>
+          </a:p>
+        </p:txBody>
+      </p:sp>
+      <p:sp>
+        <p:nvSpPr>
+          <p:cNvPr id="5" name="ZoneTexte 4"/>
+          <p:cNvSpPr txBox="1"/>
+          <p:nvPr/>
+        </p:nvSpPr>
+        <p:spPr>
+          <a:xfrm>
+            <a:off x="4533900" y="666750"/>
+            <a:ext cx="2409186" cy="923330"/>
+          </a:xfrm>
+          <a:prstGeom prst="rect">
+            <a:avLst/>
+          </a:prstGeom>
+          <a:noFill/>
+        </p:spPr>
+        <p:txBody>
+          <a:bodyPr wrap="none" rtlCol="0">
+            <a:spAutoFit/>
+          </a:bodyPr>
+          <a:lstStyle/>
+          <a:p>
+            <a:r>
+              <a:rPr lang="fr-FR" b="1" u="sng" dirty="0" smtClean="0"/>
+              <a:t>Package MyApplication</a:t>
+            </a:r>
+          </a:p>
+          <a:p>
+            <a:endParaRPr lang="fr-FR" b="1" u="sng" dirty="0" smtClean="0"/>
+          </a:p>
+          <a:p>
+            <a:pPr algn="ctr"/>
+            <a:r>
+              <a:rPr lang="fr-FR" dirty="0" smtClean="0"/>
+              <a:t>-MainActivity</a:t>
+            </a:r>
+            <a:endParaRPr lang="en-US" dirty="0"/>
+          </a:p>
+        </p:txBody>
+      </p:sp>
+      <p:sp>
+        <p:nvSpPr>
+          <p:cNvPr id="6" name="Rectangle 5"/>
+          <p:cNvSpPr/>
+          <p:nvPr/>
+        </p:nvSpPr>
+        <p:spPr>
+          <a:xfrm>
+            <a:off x="1428751" y="1894791"/>
+            <a:ext cx="3219450" cy="2647950"/>
+          </a:xfrm>
+          <a:prstGeom prst="rect">
+            <a:avLst/>
+          </a:prstGeom>
+          <a:noFill/>
+        </p:spPr>
+        <p:style>
+          <a:lnRef idx="2">
+            <a:schemeClr val="accent1">
+              <a:shade val="50000"/>
+            </a:schemeClr>
+          </a:lnRef>
+          <a:fillRef idx="1">
+            <a:schemeClr val="accent1"/>
+          </a:fillRef>
+          <a:effectRef idx="0">
+            <a:schemeClr val="accent1"/>
+          </a:effectRef>
+          <a:fontRef idx="minor">
+            <a:schemeClr val="lt1"/>
+          </a:fontRef>
+        </p:style>
+        <p:txBody>
+          <a:bodyPr rtlCol="0" anchor="ctr"/>
+          <a:lstStyle/>
+          <a:p>
+            <a:pPr algn="ctr"/>
+            <a:endParaRPr lang="en-US"/>
+          </a:p>
+        </p:txBody>
+      </p:sp>
+      <p:sp>
+        <p:nvSpPr>
+          <p:cNvPr id="7" name="ZoneTexte 6"/>
+          <p:cNvSpPr txBox="1"/>
+          <p:nvPr/>
+        </p:nvSpPr>
+        <p:spPr>
+          <a:xfrm>
+            <a:off x="2110449" y="2114550"/>
+            <a:ext cx="1436933" cy="369332"/>
+          </a:xfrm>
+          <a:prstGeom prst="rect">
+            <a:avLst/>
+          </a:prstGeom>
+          <a:noFill/>
+        </p:spPr>
+        <p:txBody>
+          <a:bodyPr wrap="none" rtlCol="0">
+            <a:spAutoFit/>
+          </a:bodyPr>
+          <a:lstStyle/>
+          <a:p>
+            <a:pPr algn="ctr"/>
+            <a:r>
+              <a:rPr lang="fr-FR" b="1" u="sng" dirty="0" smtClean="0"/>
+              <a:t>Package Http</a:t>
+            </a:r>
+            <a:endParaRPr lang="en-US" b="1" u="sng" dirty="0"/>
+          </a:p>
+        </p:txBody>
+      </p:sp>
+      <p:sp>
+        <p:nvSpPr>
+          <p:cNvPr id="8" name="ZoneTexte 7"/>
+          <p:cNvSpPr txBox="1"/>
+          <p:nvPr/>
+        </p:nvSpPr>
+        <p:spPr>
+          <a:xfrm>
+            <a:off x="1643814" y="2688199"/>
+            <a:ext cx="2370201" cy="1477328"/>
+          </a:xfrm>
+          <a:prstGeom prst="rect">
+            <a:avLst/>
+          </a:prstGeom>
+          <a:noFill/>
+        </p:spPr>
+        <p:txBody>
+          <a:bodyPr wrap="none" rtlCol="0">
+            <a:spAutoFit/>
+          </a:bodyPr>
+          <a:lstStyle/>
+          <a:p>
+            <a:pPr marL="285750" indent="-285750">
+              <a:buFontTx/>
+              <a:buChar char="-"/>
+            </a:pPr>
+            <a:r>
+              <a:rPr lang="fr-FR" dirty="0" smtClean="0"/>
+              <a:t>NanoHTTPD</a:t>
+            </a:r>
+          </a:p>
+          <a:p>
+            <a:pPr marL="285750" indent="-285750">
+              <a:buFontTx/>
+              <a:buChar char="-"/>
+            </a:pPr>
+            <a:r>
+              <a:rPr lang="fr-FR" dirty="0" smtClean="0"/>
+              <a:t>MyHttpServer</a:t>
+            </a:r>
+            <a:endParaRPr lang="fr-FR" dirty="0"/>
+          </a:p>
+          <a:p>
+            <a:pPr marL="285750" indent="-285750">
+              <a:buFontTx/>
+              <a:buChar char="-"/>
+            </a:pPr>
+            <a:r>
+              <a:rPr lang="fr-FR" dirty="0" smtClean="0"/>
+              <a:t>HttpFileDownloader</a:t>
+            </a:r>
+          </a:p>
+          <a:p>
+            <a:pPr marL="285750" indent="-285750">
+              <a:buFontTx/>
+              <a:buChar char="-"/>
+            </a:pPr>
+            <a:r>
+              <a:rPr lang="fr-FR" dirty="0" smtClean="0"/>
+              <a:t>HttpFileUploader</a:t>
+            </a:r>
+          </a:p>
+          <a:p>
+            <a:pPr marL="285750" indent="-285750">
+              <a:buFontTx/>
+              <a:buChar char="-"/>
+            </a:pPr>
+            <a:r>
+              <a:rPr lang="fr-FR" dirty="0" smtClean="0"/>
+              <a:t>HttpUrlOpener</a:t>
+            </a:r>
+          </a:p>
+        </p:txBody>
+      </p:sp>
+      <p:sp>
+        <p:nvSpPr>
+          <p:cNvPr id="9" name="Rectangle 8"/>
+          <p:cNvSpPr/>
+          <p:nvPr/>
+        </p:nvSpPr>
+        <p:spPr>
+          <a:xfrm>
+            <a:off x="6888584" y="1894791"/>
+            <a:ext cx="3219450" cy="2647950"/>
+          </a:xfrm>
+          <a:prstGeom prst="rect">
+            <a:avLst/>
+          </a:prstGeom>
+          <a:noFill/>
+        </p:spPr>
+        <p:style>
+          <a:lnRef idx="2">
+            <a:schemeClr val="accent1">
+              <a:shade val="50000"/>
+            </a:schemeClr>
+          </a:lnRef>
+          <a:fillRef idx="1">
+            <a:schemeClr val="accent1"/>
+          </a:fillRef>
+          <a:effectRef idx="0">
+            <a:schemeClr val="accent1"/>
+          </a:effectRef>
+          <a:fontRef idx="minor">
+            <a:schemeClr val="lt1"/>
+          </a:fontRef>
+        </p:style>
+        <p:txBody>
+          <a:bodyPr rtlCol="0" anchor="ctr"/>
+          <a:lstStyle/>
+          <a:p>
+            <a:pPr algn="ctr"/>
+            <a:endParaRPr lang="en-US"/>
+          </a:p>
+        </p:txBody>
+      </p:sp>
+      <p:sp>
+        <p:nvSpPr>
+          <p:cNvPr id="10" name="Rectangle 9"/>
+          <p:cNvSpPr/>
+          <p:nvPr/>
+        </p:nvSpPr>
+        <p:spPr>
+          <a:xfrm>
+            <a:off x="7887501" y="2114550"/>
+            <a:ext cx="1221616" cy="369332"/>
+          </a:xfrm>
+          <a:prstGeom prst="rect">
+            <a:avLst/>
+          </a:prstGeom>
+        </p:spPr>
+        <p:txBody>
+          <a:bodyPr wrap="none">
+            <a:spAutoFit/>
+          </a:bodyPr>
+          <a:lstStyle/>
+          <a:p>
+            <a:pPr algn="ctr"/>
+            <a:r>
+              <a:rPr lang="fr-FR" b="1" u="sng" dirty="0"/>
+              <a:t>Package </a:t>
+            </a:r>
+            <a:r>
+              <a:rPr lang="fr-FR" b="1" u="sng" dirty="0" smtClean="0"/>
+              <a:t>UI</a:t>
+            </a:r>
+            <a:endParaRPr lang="en-US" b="1" u="sng" dirty="0"/>
+          </a:p>
+        </p:txBody>
+      </p:sp>
+      <p:sp>
+        <p:nvSpPr>
+          <p:cNvPr id="11" name="Rectangle 10"/>
+          <p:cNvSpPr/>
+          <p:nvPr/>
+        </p:nvSpPr>
+        <p:spPr>
+          <a:xfrm>
+            <a:off x="7290854" y="2688199"/>
+            <a:ext cx="2414910" cy="1276350"/>
+          </a:xfrm>
+          <a:prstGeom prst="rect">
+            <a:avLst/>
+          </a:prstGeom>
+          <a:noFill/>
+        </p:spPr>
+        <p:style>
+          <a:lnRef idx="2">
+            <a:schemeClr val="accent1">
+              <a:shade val="50000"/>
+            </a:schemeClr>
+          </a:lnRef>
+          <a:fillRef idx="1">
+            <a:schemeClr val="accent1"/>
+          </a:fillRef>
+          <a:effectRef idx="0">
+            <a:schemeClr val="accent1"/>
+          </a:effectRef>
+          <a:fontRef idx="minor">
+            <a:schemeClr val="lt1"/>
+          </a:fontRef>
+        </p:style>
+        <p:txBody>
+          <a:bodyPr rtlCol="0" anchor="ctr"/>
+          <a:lstStyle/>
+          <a:p>
+            <a:pPr algn="ctr"/>
+            <a:endParaRPr lang="en-US"/>
+          </a:p>
+        </p:txBody>
+      </p:sp>
+      <p:sp>
+        <p:nvSpPr>
+          <p:cNvPr id="12" name="Rectangle 11"/>
+          <p:cNvSpPr/>
+          <p:nvPr/>
+        </p:nvSpPr>
+        <p:spPr>
+          <a:xfrm>
+            <a:off x="7923474" y="2725519"/>
+            <a:ext cx="1149674" cy="338554"/>
+          </a:xfrm>
+          <a:prstGeom prst="rect">
+            <a:avLst/>
+          </a:prstGeom>
+        </p:spPr>
+        <p:txBody>
+          <a:bodyPr wrap="none">
+            <a:spAutoFit/>
+          </a:bodyPr>
+          <a:lstStyle/>
+          <a:p>
+            <a:pPr algn="ctr"/>
+            <a:r>
+              <a:rPr lang="fr-FR" sz="1600" b="1" u="sng" dirty="0" err="1" smtClean="0"/>
+              <a:t>Filetransfer</a:t>
+            </a:r>
+            <a:endParaRPr lang="en-US" sz="1600" b="1" u="sng" dirty="0"/>
+          </a:p>
+        </p:txBody>
+      </p:sp>
+      <p:sp>
+        <p:nvSpPr>
+          <p:cNvPr id="14" name="ZoneTexte 13"/>
+          <p:cNvSpPr txBox="1"/>
+          <p:nvPr/>
+        </p:nvSpPr>
+        <p:spPr>
+          <a:xfrm>
+            <a:off x="7457619" y="3101393"/>
+            <a:ext cx="2400755" cy="584775"/>
+          </a:xfrm>
+          <a:prstGeom prst="rect">
+            <a:avLst/>
+          </a:prstGeom>
+          <a:noFill/>
+        </p:spPr>
+        <p:txBody>
+          <a:bodyPr wrap="square" rtlCol="0">
+            <a:spAutoFit/>
+          </a:bodyPr>
+          <a:lstStyle/>
+          <a:p>
+            <a:r>
+              <a:rPr lang="fr-FR" sz="1600" dirty="0" smtClean="0"/>
+              <a:t>- FiletransferFragment</a:t>
+            </a:r>
+          </a:p>
+          <a:p>
+            <a:r>
+              <a:rPr lang="fr-FR" sz="1600" dirty="0" smtClean="0"/>
+              <a:t>- FiletransferViewModel</a:t>
+            </a:r>
+            <a:endParaRPr lang="en-US" sz="1600" dirty="0"/>
+          </a:p>
+        </p:txBody>
+      </p:sp>
+    </p:spTree>
+    <p:extLst>
+      <p:ext uri="{BB962C8B-B14F-4D97-AF65-F5344CB8AC3E}">
+        <p14:creationId xmlns:p14="http://schemas.microsoft.com/office/powerpoint/2010/main" val="3944216787"/>
+      </p:ext>
+    </p:extLst>
+  </p:cSld>
+  <p:clrMapOvr>
+    <a:masterClrMapping/>
+  </p:clrMapOvr>
+</p:sld>
+</file>
+
+<file path=ppt/slides/slide7.xml><?xml version="1.0" encoding="utf-8"?>
+<p:sld xmlns:a="http://schemas.openxmlformats.org/drawingml/2006/main" xmlns:r="http://schemas.openxmlformats.org/officeDocument/2006/relationships" xmlns:p="http://schemas.openxmlformats.org/presentationml/2006/main">
+  <p:cSld>
+    <p:spTree>
+      <p:nvGrpSpPr>
+        <p:cNvPr id="1" name=""/>
+        <p:cNvGrpSpPr/>
+        <p:nvPr/>
+      </p:nvGrpSpPr>
+      <p:grpSpPr>
+        <a:xfrm>
+          <a:off x="0" y="0"/>
+          <a:ext cx="0" cy="0"/>
+          <a:chOff x="0" y="0"/>
+          <a:chExt cx="0" cy="0"/>
+        </a:xfrm>
+      </p:grpSpPr>
+      <p:pic>
+        <p:nvPicPr>
+          <p:cNvPr id="4" name="Image 3"/>
+          <p:cNvPicPr>
+            <a:picLocks noChangeAspect="1"/>
+          </p:cNvPicPr>
+          <p:nvPr/>
+        </p:nvPicPr>
+        <p:blipFill>
+          <a:blip r:embed="rId2">
+            <a:extLst>
+              <a:ext uri="{28A0092B-C50C-407E-A947-70E740481C1C}">
+                <a14:useLocalDpi xmlns:a14="http://schemas.microsoft.com/office/drawing/2010/main" val="0"/>
+              </a:ext>
+            </a:extLst>
+          </a:blip>
+          <a:stretch>
+            <a:fillRect/>
+          </a:stretch>
+        </p:blipFill>
+        <p:spPr>
+          <a:xfrm>
+            <a:off x="8562260" y="390525"/>
+            <a:ext cx="2992279" cy="6219825"/>
+          </a:xfrm>
+          <a:prstGeom prst="rect">
+            <a:avLst/>
+          </a:prstGeom>
+        </p:spPr>
+      </p:pic>
+      <p:pic>
+        <p:nvPicPr>
+          <p:cNvPr id="6" name="Image 5"/>
+          <p:cNvPicPr>
+            <a:picLocks noChangeAspect="1"/>
+          </p:cNvPicPr>
+          <p:nvPr/>
+        </p:nvPicPr>
+        <p:blipFill>
+          <a:blip r:embed="rId3">
+            <a:extLst>
+              <a:ext uri="{28A0092B-C50C-407E-A947-70E740481C1C}">
+                <a14:useLocalDpi xmlns:a14="http://schemas.microsoft.com/office/drawing/2010/main" val="0"/>
+              </a:ext>
+            </a:extLst>
+          </a:blip>
+          <a:stretch>
+            <a:fillRect/>
+          </a:stretch>
+        </p:blipFill>
+        <p:spPr>
+          <a:xfrm>
+            <a:off x="4705189" y="390526"/>
+            <a:ext cx="2992279" cy="6219824"/>
+          </a:xfrm>
+          <a:prstGeom prst="rect">
+            <a:avLst/>
+          </a:prstGeom>
+        </p:spPr>
+      </p:pic>
+      <p:pic>
+        <p:nvPicPr>
+          <p:cNvPr id="7" name="Image 6"/>
+          <p:cNvPicPr>
+            <a:picLocks noChangeAspect="1"/>
+          </p:cNvPicPr>
+          <p:nvPr/>
+        </p:nvPicPr>
+        <p:blipFill>
+          <a:blip r:embed="rId4"/>
+          <a:stretch>
+            <a:fillRect/>
+          </a:stretch>
+        </p:blipFill>
+        <p:spPr>
+          <a:xfrm>
+            <a:off x="726621" y="390525"/>
+            <a:ext cx="3009900" cy="6276975"/>
+          </a:xfrm>
+          <a:prstGeom prst="rect">
+            <a:avLst/>
+          </a:prstGeom>
+        </p:spPr>
+      </p:pic>
+    </p:spTree>
+    <p:extLst>
+      <p:ext uri="{BB962C8B-B14F-4D97-AF65-F5344CB8AC3E}">
+        <p14:creationId xmlns:p14="http://schemas.microsoft.com/office/powerpoint/2010/main" val="2249519501"/>
+      </p:ext>
+    </p:extLst>
+  </p:cSld>
+  <p:clrMapOvr>
+    <a:masterClrMapping/>
+  </p:clrMapOvr>
+</p:sld>
+</file>
+
+<file path=ppt/slides/slide8.xml><?xml version="1.0" encoding="utf-8"?>
+<p:sld xmlns:a="http://schemas.openxmlformats.org/drawingml/2006/main" xmlns:r="http://schemas.openxmlformats.org/officeDocument/2006/relationships" xmlns:p="http://schemas.openxmlformats.org/presentationml/2006/main">
+  <p:cSld>
+    <p:spTree>
+      <p:nvGrpSpPr>
+        <p:cNvPr id="1" name=""/>
+        <p:cNvGrpSpPr/>
+        <p:nvPr/>
+      </p:nvGrpSpPr>
+      <p:grpSpPr>
+        <a:xfrm>
+          <a:off x="0" y="0"/>
+          <a:ext cx="0" cy="0"/>
+          <a:chOff x="0" y="0"/>
+          <a:chExt cx="0" cy="0"/>
+        </a:xfrm>
+      </p:grpSpPr>
+      <p:pic>
+        <p:nvPicPr>
+          <p:cNvPr id="4" name="Image 3"/>
+          <p:cNvPicPr>
+            <a:picLocks noChangeAspect="1"/>
+          </p:cNvPicPr>
+          <p:nvPr/>
+        </p:nvPicPr>
+        <p:blipFill>
+          <a:blip r:embed="rId2">
+            <a:extLst>
+              <a:ext uri="{28A0092B-C50C-407E-A947-70E740481C1C}">
+                <a14:useLocalDpi xmlns:a14="http://schemas.microsoft.com/office/drawing/2010/main" val="0"/>
+              </a:ext>
+            </a:extLst>
+          </a:blip>
+          <a:stretch>
+            <a:fillRect/>
+          </a:stretch>
+        </p:blipFill>
+        <p:spPr>
+          <a:xfrm>
+            <a:off x="8765017" y="108857"/>
+            <a:ext cx="3189320" cy="6629400"/>
+          </a:xfrm>
+          <a:prstGeom prst="rect">
+            <a:avLst/>
+          </a:prstGeom>
+        </p:spPr>
+      </p:pic>
+      <p:pic>
+        <p:nvPicPr>
+          <p:cNvPr id="5" name="Image 4"/>
+          <p:cNvPicPr>
+            <a:picLocks noChangeAspect="1"/>
+          </p:cNvPicPr>
+          <p:nvPr/>
+        </p:nvPicPr>
+        <p:blipFill>
+          <a:blip r:embed="rId3">
+            <a:extLst>
+              <a:ext uri="{28A0092B-C50C-407E-A947-70E740481C1C}">
+                <a14:useLocalDpi xmlns:a14="http://schemas.microsoft.com/office/drawing/2010/main" val="0"/>
+              </a:ext>
+            </a:extLst>
+          </a:blip>
+          <a:stretch>
+            <a:fillRect/>
+          </a:stretch>
+        </p:blipFill>
+        <p:spPr>
+          <a:xfrm>
+            <a:off x="859267" y="108857"/>
+            <a:ext cx="3189320" cy="6629400"/>
+          </a:xfrm>
+          <a:prstGeom prst="rect">
+            <a:avLst/>
+          </a:prstGeom>
+        </p:spPr>
+      </p:pic>
+      <p:pic>
+        <p:nvPicPr>
+          <p:cNvPr id="6" name="Image 5"/>
+          <p:cNvPicPr>
+            <a:picLocks noChangeAspect="1"/>
+          </p:cNvPicPr>
+          <p:nvPr/>
+        </p:nvPicPr>
+        <p:blipFill>
+          <a:blip r:embed="rId4">
+            <a:extLst>
+              <a:ext uri="{28A0092B-C50C-407E-A947-70E740481C1C}">
+                <a14:useLocalDpi xmlns:a14="http://schemas.microsoft.com/office/drawing/2010/main" val="0"/>
+              </a:ext>
+            </a:extLst>
+          </a:blip>
+          <a:stretch>
+            <a:fillRect/>
+          </a:stretch>
+        </p:blipFill>
+        <p:spPr>
+          <a:xfrm>
+            <a:off x="4812142" y="108857"/>
+            <a:ext cx="3189320" cy="6629400"/>
+          </a:xfrm>
+          <a:prstGeom prst="rect">
+            <a:avLst/>
+          </a:prstGeom>
+        </p:spPr>
+      </p:pic>
+    </p:spTree>
+    <p:extLst>
+      <p:ext uri="{BB962C8B-B14F-4D97-AF65-F5344CB8AC3E}">
+        <p14:creationId xmlns:p14="http://schemas.microsoft.com/office/powerpoint/2010/main" val="4186189739"/>
+      </p:ext>
+    </p:extLst>
+  </p:cSld>
+  <p:clrMapOvr>
+    <a:masterClrMapping/>
+  </p:clrMapOvr>
+</p:sld>
+</file>
+
+<file path=ppt/slides/slide9.xml><?xml version="1.0" encoding="utf-8"?>
+<p:sld xmlns:a="http://schemas.openxmlformats.org/drawingml/2006/main" xmlns:r="http://schemas.openxmlformats.org/officeDocument/2006/relationships" xmlns:p="http://schemas.openxmlformats.org/presentationml/2006/main">
+  <p:cSld>
+    <p:spTree>
+      <p:nvGrpSpPr>
+        <p:cNvPr id="1" name=""/>
+        <p:cNvGrpSpPr/>
+        <p:nvPr/>
+      </p:nvGrpSpPr>
+      <p:grpSpPr>
+        <a:xfrm>
+          <a:off x="0" y="0"/>
+          <a:ext cx="0" cy="0"/>
+          <a:chOff x="0" y="0"/>
+          <a:chExt cx="0" cy="0"/>
+        </a:xfrm>
+      </p:grpSpPr>
+      <p:pic>
+        <p:nvPicPr>
+          <p:cNvPr id="4" name="Image 3"/>
+          <p:cNvPicPr>
+            <a:picLocks noChangeAspect="1"/>
+          </p:cNvPicPr>
+          <p:nvPr/>
+        </p:nvPicPr>
+        <p:blipFill>
+          <a:blip r:embed="rId2">
+            <a:extLst>
+              <a:ext uri="{28A0092B-C50C-407E-A947-70E740481C1C}">
+                <a14:useLocalDpi xmlns:a14="http://schemas.microsoft.com/office/drawing/2010/main" val="0"/>
+              </a:ext>
+            </a:extLst>
+          </a:blip>
+          <a:stretch>
+            <a:fillRect/>
+          </a:stretch>
+        </p:blipFill>
+        <p:spPr>
+          <a:xfrm>
+            <a:off x="817326" y="0"/>
+            <a:ext cx="3299297" cy="6858000"/>
+          </a:xfrm>
+          <a:prstGeom prst="rect">
+            <a:avLst/>
+          </a:prstGeom>
+        </p:spPr>
+      </p:pic>
+      <p:pic>
+        <p:nvPicPr>
+          <p:cNvPr id="5" name="Image 4"/>
+          <p:cNvPicPr>
+            <a:picLocks noChangeAspect="1"/>
+          </p:cNvPicPr>
+          <p:nvPr/>
+        </p:nvPicPr>
+        <p:blipFill>
+          <a:blip r:embed="rId3">
+            <a:extLst>
+              <a:ext uri="{28A0092B-C50C-407E-A947-70E740481C1C}">
+                <a14:useLocalDpi xmlns:a14="http://schemas.microsoft.com/office/drawing/2010/main" val="0"/>
+              </a:ext>
+            </a:extLst>
+          </a:blip>
+          <a:stretch>
+            <a:fillRect/>
+          </a:stretch>
+        </p:blipFill>
+        <p:spPr>
+          <a:xfrm>
+            <a:off x="8374384" y="-1"/>
+            <a:ext cx="3284216" cy="6826653"/>
+          </a:xfrm>
+          <a:prstGeom prst="rect">
+            <a:avLst/>
+          </a:prstGeom>
+        </p:spPr>
+      </p:pic>
+      <p:pic>
+        <p:nvPicPr>
+          <p:cNvPr id="6" name="Image 5"/>
+          <p:cNvPicPr>
+            <a:picLocks noChangeAspect="1"/>
+          </p:cNvPicPr>
+          <p:nvPr/>
+        </p:nvPicPr>
+        <p:blipFill>
+          <a:blip r:embed="rId4">
+            <a:extLst>
+              <a:ext uri="{28A0092B-C50C-407E-A947-70E740481C1C}">
+                <a14:useLocalDpi xmlns:a14="http://schemas.microsoft.com/office/drawing/2010/main" val="0"/>
+              </a:ext>
+            </a:extLst>
+          </a:blip>
+          <a:stretch>
+            <a:fillRect/>
+          </a:stretch>
+        </p:blipFill>
+        <p:spPr>
+          <a:xfrm>
+            <a:off x="4517313" y="0"/>
+            <a:ext cx="3284216" cy="6826652"/>
+          </a:xfrm>
+          <a:prstGeom prst="rect">
+            <a:avLst/>
+          </a:prstGeom>
+        </p:spPr>
+      </p:pic>
+    </p:spTree>
+    <p:extLst>
+      <p:ext uri="{BB962C8B-B14F-4D97-AF65-F5344CB8AC3E}">
+        <p14:creationId xmlns:p14="http://schemas.microsoft.com/office/powerpoint/2010/main" val="237931984"/>
       </p:ext>
     </p:extLst>
   </p:cSld>

</xml_diff>

<commit_message>
-Updating the intership report in version Word and PDF
</commit_message>
<xml_diff>
--- a/Présentation_image.pptx
+++ b/Présentation_image.pptx
@@ -11,9 +11,12 @@
     <p:sldId id="258" r:id="rId5"/>
     <p:sldId id="259" r:id="rId6"/>
     <p:sldId id="260" r:id="rId7"/>
-    <p:sldId id="261" r:id="rId8"/>
-    <p:sldId id="262" r:id="rId9"/>
-    <p:sldId id="264" r:id="rId10"/>
+    <p:sldId id="265" r:id="rId8"/>
+    <p:sldId id="261" r:id="rId9"/>
+    <p:sldId id="262" r:id="rId10"/>
+    <p:sldId id="264" r:id="rId11"/>
+    <p:sldId id="266" r:id="rId12"/>
+    <p:sldId id="267" r:id="rId13"/>
   </p:sldIdLst>
   <p:sldSz cx="12192000" cy="6858000"/>
   <p:notesSz cx="6858000" cy="9144000"/>
@@ -251,7 +254,7 @@
           <a:p>
             <a:fld id="{6D53E27C-41F9-477C-981C-F16B615EFA3D}" type="datetimeFigureOut">
               <a:rPr lang="en-US" smtClean="0"/>
-              <a:t>9/28/2021</a:t>
+              <a:t>9/29/2021</a:t>
             </a:fld>
             <a:endParaRPr lang="en-US"/>
           </a:p>
@@ -421,7 +424,7 @@
           <a:p>
             <a:fld id="{6D53E27C-41F9-477C-981C-F16B615EFA3D}" type="datetimeFigureOut">
               <a:rPr lang="en-US" smtClean="0"/>
-              <a:t>9/28/2021</a:t>
+              <a:t>9/29/2021</a:t>
             </a:fld>
             <a:endParaRPr lang="en-US"/>
           </a:p>
@@ -601,7 +604,7 @@
           <a:p>
             <a:fld id="{6D53E27C-41F9-477C-981C-F16B615EFA3D}" type="datetimeFigureOut">
               <a:rPr lang="en-US" smtClean="0"/>
-              <a:t>9/28/2021</a:t>
+              <a:t>9/29/2021</a:t>
             </a:fld>
             <a:endParaRPr lang="en-US"/>
           </a:p>
@@ -771,7 +774,7 @@
           <a:p>
             <a:fld id="{6D53E27C-41F9-477C-981C-F16B615EFA3D}" type="datetimeFigureOut">
               <a:rPr lang="en-US" smtClean="0"/>
-              <a:t>9/28/2021</a:t>
+              <a:t>9/29/2021</a:t>
             </a:fld>
             <a:endParaRPr lang="en-US"/>
           </a:p>
@@ -1017,7 +1020,7 @@
           <a:p>
             <a:fld id="{6D53E27C-41F9-477C-981C-F16B615EFA3D}" type="datetimeFigureOut">
               <a:rPr lang="en-US" smtClean="0"/>
-              <a:t>9/28/2021</a:t>
+              <a:t>9/29/2021</a:t>
             </a:fld>
             <a:endParaRPr lang="en-US"/>
           </a:p>
@@ -1249,7 +1252,7 @@
           <a:p>
             <a:fld id="{6D53E27C-41F9-477C-981C-F16B615EFA3D}" type="datetimeFigureOut">
               <a:rPr lang="en-US" smtClean="0"/>
-              <a:t>9/28/2021</a:t>
+              <a:t>9/29/2021</a:t>
             </a:fld>
             <a:endParaRPr lang="en-US"/>
           </a:p>
@@ -1616,7 +1619,7 @@
           <a:p>
             <a:fld id="{6D53E27C-41F9-477C-981C-F16B615EFA3D}" type="datetimeFigureOut">
               <a:rPr lang="en-US" smtClean="0"/>
-              <a:t>9/28/2021</a:t>
+              <a:t>9/29/2021</a:t>
             </a:fld>
             <a:endParaRPr lang="en-US"/>
           </a:p>
@@ -1734,7 +1737,7 @@
           <a:p>
             <a:fld id="{6D53E27C-41F9-477C-981C-F16B615EFA3D}" type="datetimeFigureOut">
               <a:rPr lang="en-US" smtClean="0"/>
-              <a:t>9/28/2021</a:t>
+              <a:t>9/29/2021</a:t>
             </a:fld>
             <a:endParaRPr lang="en-US"/>
           </a:p>
@@ -1829,7 +1832,7 @@
           <a:p>
             <a:fld id="{6D53E27C-41F9-477C-981C-F16B615EFA3D}" type="datetimeFigureOut">
               <a:rPr lang="en-US" smtClean="0"/>
-              <a:t>9/28/2021</a:t>
+              <a:t>9/29/2021</a:t>
             </a:fld>
             <a:endParaRPr lang="en-US"/>
           </a:p>
@@ -2106,7 +2109,7 @@
           <a:p>
             <a:fld id="{6D53E27C-41F9-477C-981C-F16B615EFA3D}" type="datetimeFigureOut">
               <a:rPr lang="en-US" smtClean="0"/>
-              <a:t>9/28/2021</a:t>
+              <a:t>9/29/2021</a:t>
             </a:fld>
             <a:endParaRPr lang="en-US"/>
           </a:p>
@@ -2359,7 +2362,7 @@
           <a:p>
             <a:fld id="{6D53E27C-41F9-477C-981C-F16B615EFA3D}" type="datetimeFigureOut">
               <a:rPr lang="en-US" smtClean="0"/>
-              <a:t>9/28/2021</a:t>
+              <a:t>9/29/2021</a:t>
             </a:fld>
             <a:endParaRPr lang="en-US"/>
           </a:p>
@@ -2572,7 +2575,7 @@
           <a:p>
             <a:fld id="{6D53E27C-41F9-477C-981C-F16B615EFA3D}" type="datetimeFigureOut">
               <a:rPr lang="en-US" smtClean="0"/>
-              <a:t>9/28/2021</a:t>
+              <a:t>9/29/2021</a:t>
             </a:fld>
             <a:endParaRPr lang="en-US"/>
           </a:p>
@@ -3709,6 +3712,595 @@
 </p:sld>
 </file>
 
+<file path=ppt/slides/slide10.xml><?xml version="1.0" encoding="utf-8"?>
+<p:sld xmlns:a="http://schemas.openxmlformats.org/drawingml/2006/main" xmlns:r="http://schemas.openxmlformats.org/officeDocument/2006/relationships" xmlns:p="http://schemas.openxmlformats.org/presentationml/2006/main">
+  <p:cSld>
+    <p:spTree>
+      <p:nvGrpSpPr>
+        <p:cNvPr id="1" name=""/>
+        <p:cNvGrpSpPr/>
+        <p:nvPr/>
+      </p:nvGrpSpPr>
+      <p:grpSpPr>
+        <a:xfrm>
+          <a:off x="0" y="0"/>
+          <a:ext cx="0" cy="0"/>
+          <a:chOff x="0" y="0"/>
+          <a:chExt cx="0" cy="0"/>
+        </a:xfrm>
+      </p:grpSpPr>
+      <p:pic>
+        <p:nvPicPr>
+          <p:cNvPr id="4" name="Image 3"/>
+          <p:cNvPicPr>
+            <a:picLocks noChangeAspect="1"/>
+          </p:cNvPicPr>
+          <p:nvPr/>
+        </p:nvPicPr>
+        <p:blipFill>
+          <a:blip r:embed="rId2">
+            <a:extLst>
+              <a:ext uri="{28A0092B-C50C-407E-A947-70E740481C1C}">
+                <a14:useLocalDpi xmlns:a14="http://schemas.microsoft.com/office/drawing/2010/main" val="0"/>
+              </a:ext>
+            </a:extLst>
+          </a:blip>
+          <a:stretch>
+            <a:fillRect/>
+          </a:stretch>
+        </p:blipFill>
+        <p:spPr>
+          <a:xfrm>
+            <a:off x="817326" y="0"/>
+            <a:ext cx="3299297" cy="6858000"/>
+          </a:xfrm>
+          <a:prstGeom prst="rect">
+            <a:avLst/>
+          </a:prstGeom>
+        </p:spPr>
+      </p:pic>
+      <p:pic>
+        <p:nvPicPr>
+          <p:cNvPr id="5" name="Image 4"/>
+          <p:cNvPicPr>
+            <a:picLocks noChangeAspect="1"/>
+          </p:cNvPicPr>
+          <p:nvPr/>
+        </p:nvPicPr>
+        <p:blipFill>
+          <a:blip r:embed="rId3">
+            <a:extLst>
+              <a:ext uri="{28A0092B-C50C-407E-A947-70E740481C1C}">
+                <a14:useLocalDpi xmlns:a14="http://schemas.microsoft.com/office/drawing/2010/main" val="0"/>
+              </a:ext>
+            </a:extLst>
+          </a:blip>
+          <a:stretch>
+            <a:fillRect/>
+          </a:stretch>
+        </p:blipFill>
+        <p:spPr>
+          <a:xfrm>
+            <a:off x="8374384" y="-1"/>
+            <a:ext cx="3284216" cy="6826653"/>
+          </a:xfrm>
+          <a:prstGeom prst="rect">
+            <a:avLst/>
+          </a:prstGeom>
+        </p:spPr>
+      </p:pic>
+      <p:pic>
+        <p:nvPicPr>
+          <p:cNvPr id="6" name="Image 5"/>
+          <p:cNvPicPr>
+            <a:picLocks noChangeAspect="1"/>
+          </p:cNvPicPr>
+          <p:nvPr/>
+        </p:nvPicPr>
+        <p:blipFill>
+          <a:blip r:embed="rId4">
+            <a:extLst>
+              <a:ext uri="{28A0092B-C50C-407E-A947-70E740481C1C}">
+                <a14:useLocalDpi xmlns:a14="http://schemas.microsoft.com/office/drawing/2010/main" val="0"/>
+              </a:ext>
+            </a:extLst>
+          </a:blip>
+          <a:stretch>
+            <a:fillRect/>
+          </a:stretch>
+        </p:blipFill>
+        <p:spPr>
+          <a:xfrm>
+            <a:off x="4517313" y="0"/>
+            <a:ext cx="3284216" cy="6826652"/>
+          </a:xfrm>
+          <a:prstGeom prst="rect">
+            <a:avLst/>
+          </a:prstGeom>
+        </p:spPr>
+      </p:pic>
+    </p:spTree>
+    <p:extLst>
+      <p:ext uri="{BB962C8B-B14F-4D97-AF65-F5344CB8AC3E}">
+        <p14:creationId xmlns:p14="http://schemas.microsoft.com/office/powerpoint/2010/main" val="237931984"/>
+      </p:ext>
+    </p:extLst>
+  </p:cSld>
+  <p:clrMapOvr>
+    <a:masterClrMapping/>
+  </p:clrMapOvr>
+</p:sld>
+</file>
+
+<file path=ppt/slides/slide11.xml><?xml version="1.0" encoding="utf-8"?>
+<p:sld xmlns:a="http://schemas.openxmlformats.org/drawingml/2006/main" xmlns:r="http://schemas.openxmlformats.org/officeDocument/2006/relationships" xmlns:p="http://schemas.openxmlformats.org/presentationml/2006/main">
+  <p:cSld>
+    <p:spTree>
+      <p:nvGrpSpPr>
+        <p:cNvPr id="1" name=""/>
+        <p:cNvGrpSpPr/>
+        <p:nvPr/>
+      </p:nvGrpSpPr>
+      <p:grpSpPr>
+        <a:xfrm>
+          <a:off x="0" y="0"/>
+          <a:ext cx="0" cy="0"/>
+          <a:chOff x="0" y="0"/>
+          <a:chExt cx="0" cy="0"/>
+        </a:xfrm>
+      </p:grpSpPr>
+      <p:pic>
+        <p:nvPicPr>
+          <p:cNvPr id="5" name="Image 4"/>
+          <p:cNvPicPr>
+            <a:picLocks noChangeAspect="1"/>
+          </p:cNvPicPr>
+          <p:nvPr/>
+        </p:nvPicPr>
+        <p:blipFill>
+          <a:blip r:embed="rId2">
+            <a:extLst>
+              <a:ext uri="{28A0092B-C50C-407E-A947-70E740481C1C}">
+                <a14:useLocalDpi xmlns:a14="http://schemas.microsoft.com/office/drawing/2010/main" val="0"/>
+              </a:ext>
+            </a:extLst>
+          </a:blip>
+          <a:stretch>
+            <a:fillRect/>
+          </a:stretch>
+        </p:blipFill>
+        <p:spPr>
+          <a:xfrm>
+            <a:off x="2888306" y="165100"/>
+            <a:ext cx="3036463" cy="6502400"/>
+          </a:xfrm>
+          <a:prstGeom prst="rect">
+            <a:avLst/>
+          </a:prstGeom>
+        </p:spPr>
+      </p:pic>
+      <p:sp>
+        <p:nvSpPr>
+          <p:cNvPr id="6" name="Rectangle 5"/>
+          <p:cNvSpPr/>
+          <p:nvPr/>
+        </p:nvSpPr>
+        <p:spPr>
+          <a:xfrm>
+            <a:off x="3199212" y="2085975"/>
+            <a:ext cx="2449113" cy="790575"/>
+          </a:xfrm>
+          <a:prstGeom prst="rect">
+            <a:avLst/>
+          </a:prstGeom>
+          <a:noFill/>
+          <a:ln>
+            <a:solidFill>
+              <a:srgbClr val="FF0000"/>
+            </a:solidFill>
+          </a:ln>
+        </p:spPr>
+        <p:style>
+          <a:lnRef idx="2">
+            <a:schemeClr val="accent1">
+              <a:shade val="50000"/>
+            </a:schemeClr>
+          </a:lnRef>
+          <a:fillRef idx="1">
+            <a:schemeClr val="accent1"/>
+          </a:fillRef>
+          <a:effectRef idx="0">
+            <a:schemeClr val="accent1"/>
+          </a:effectRef>
+          <a:fontRef idx="minor">
+            <a:schemeClr val="lt1"/>
+          </a:fontRef>
+        </p:style>
+        <p:txBody>
+          <a:bodyPr rtlCol="0" anchor="ctr"/>
+          <a:lstStyle/>
+          <a:p>
+            <a:pPr algn="ctr"/>
+            <a:endParaRPr lang="en-US"/>
+          </a:p>
+        </p:txBody>
+      </p:sp>
+      <p:sp>
+        <p:nvSpPr>
+          <p:cNvPr id="7" name="Rectangle 6"/>
+          <p:cNvSpPr/>
+          <p:nvPr/>
+        </p:nvSpPr>
+        <p:spPr>
+          <a:xfrm>
+            <a:off x="3199212" y="4133849"/>
+            <a:ext cx="2449113" cy="561975"/>
+          </a:xfrm>
+          <a:prstGeom prst="rect">
+            <a:avLst/>
+          </a:prstGeom>
+          <a:noFill/>
+          <a:ln>
+            <a:solidFill>
+              <a:srgbClr val="FF0000"/>
+            </a:solidFill>
+          </a:ln>
+        </p:spPr>
+        <p:style>
+          <a:lnRef idx="2">
+            <a:schemeClr val="accent1">
+              <a:shade val="50000"/>
+            </a:schemeClr>
+          </a:lnRef>
+          <a:fillRef idx="1">
+            <a:schemeClr val="accent1"/>
+          </a:fillRef>
+          <a:effectRef idx="0">
+            <a:schemeClr val="accent1"/>
+          </a:effectRef>
+          <a:fontRef idx="minor">
+            <a:schemeClr val="lt1"/>
+          </a:fontRef>
+        </p:style>
+        <p:txBody>
+          <a:bodyPr rtlCol="0" anchor="ctr"/>
+          <a:lstStyle/>
+          <a:p>
+            <a:pPr algn="ctr"/>
+            <a:endParaRPr lang="en-US"/>
+          </a:p>
+        </p:txBody>
+      </p:sp>
+      <p:sp>
+        <p:nvSpPr>
+          <p:cNvPr id="8" name="ZoneTexte 7"/>
+          <p:cNvSpPr txBox="1"/>
+          <p:nvPr/>
+        </p:nvSpPr>
+        <p:spPr>
+          <a:xfrm>
+            <a:off x="8839200" y="2490460"/>
+            <a:ext cx="2521652" cy="369332"/>
+          </a:xfrm>
+          <a:prstGeom prst="rect">
+            <a:avLst/>
+          </a:prstGeom>
+          <a:noFill/>
+        </p:spPr>
+        <p:txBody>
+          <a:bodyPr wrap="none" rtlCol="0">
+            <a:spAutoFit/>
+          </a:bodyPr>
+          <a:lstStyle/>
+          <a:p>
+            <a:r>
+              <a:rPr lang="fr-FR" dirty="0" smtClean="0"/>
+              <a:t>"Connexions" TableView </a:t>
+            </a:r>
+            <a:endParaRPr lang="en-US" dirty="0"/>
+          </a:p>
+        </p:txBody>
+      </p:sp>
+      <p:sp>
+        <p:nvSpPr>
+          <p:cNvPr id="10" name="Rectangle 9"/>
+          <p:cNvSpPr/>
+          <p:nvPr/>
+        </p:nvSpPr>
+        <p:spPr>
+          <a:xfrm>
+            <a:off x="8639175" y="2310706"/>
+            <a:ext cx="2721677" cy="728840"/>
+          </a:xfrm>
+          <a:prstGeom prst="rect">
+            <a:avLst/>
+          </a:prstGeom>
+          <a:noFill/>
+        </p:spPr>
+        <p:style>
+          <a:lnRef idx="2">
+            <a:schemeClr val="accent1">
+              <a:shade val="50000"/>
+            </a:schemeClr>
+          </a:lnRef>
+          <a:fillRef idx="1">
+            <a:schemeClr val="accent1"/>
+          </a:fillRef>
+          <a:effectRef idx="0">
+            <a:schemeClr val="accent1"/>
+          </a:effectRef>
+          <a:fontRef idx="minor">
+            <a:schemeClr val="lt1"/>
+          </a:fontRef>
+        </p:style>
+        <p:txBody>
+          <a:bodyPr rtlCol="0" anchor="ctr"/>
+          <a:lstStyle/>
+          <a:p>
+            <a:pPr algn="ctr"/>
+            <a:endParaRPr lang="en-US"/>
+          </a:p>
+        </p:txBody>
+      </p:sp>
+      <p:sp>
+        <p:nvSpPr>
+          <p:cNvPr id="14" name="ZoneTexte 13"/>
+          <p:cNvSpPr txBox="1"/>
+          <p:nvPr/>
+        </p:nvSpPr>
+        <p:spPr>
+          <a:xfrm>
+            <a:off x="8766487" y="4293764"/>
+            <a:ext cx="2797176" cy="369332"/>
+          </a:xfrm>
+          <a:prstGeom prst="rect">
+            <a:avLst/>
+          </a:prstGeom>
+          <a:noFill/>
+        </p:spPr>
+        <p:txBody>
+          <a:bodyPr wrap="none" rtlCol="0">
+            <a:spAutoFit/>
+          </a:bodyPr>
+          <a:lstStyle/>
+          <a:p>
+            <a:r>
+              <a:rPr lang="fr-FR" dirty="0" smtClean="0"/>
+              <a:t> "Files </a:t>
+            </a:r>
+            <a:r>
+              <a:rPr lang="fr-FR" dirty="0" err="1" smtClean="0"/>
+              <a:t>Transfers</a:t>
+            </a:r>
+            <a:r>
+              <a:rPr lang="fr-FR" dirty="0" smtClean="0"/>
+              <a:t>" TableView </a:t>
+            </a:r>
+            <a:endParaRPr lang="en-US" dirty="0"/>
+          </a:p>
+        </p:txBody>
+      </p:sp>
+      <p:sp>
+        <p:nvSpPr>
+          <p:cNvPr id="20" name="Flèche droite 19"/>
+          <p:cNvSpPr/>
+          <p:nvPr/>
+        </p:nvSpPr>
+        <p:spPr>
+          <a:xfrm rot="11286018">
+            <a:off x="6200775" y="2310706"/>
+            <a:ext cx="1971675" cy="549086"/>
+          </a:xfrm>
+          <a:prstGeom prst="rightArrow">
+            <a:avLst>
+              <a:gd name="adj1" fmla="val 18775"/>
+              <a:gd name="adj2" fmla="val 50000"/>
+            </a:avLst>
+          </a:prstGeom>
+        </p:spPr>
+        <p:style>
+          <a:lnRef idx="2">
+            <a:schemeClr val="accent1">
+              <a:shade val="50000"/>
+            </a:schemeClr>
+          </a:lnRef>
+          <a:fillRef idx="1">
+            <a:schemeClr val="accent1"/>
+          </a:fillRef>
+          <a:effectRef idx="0">
+            <a:schemeClr val="accent1"/>
+          </a:effectRef>
+          <a:fontRef idx="minor">
+            <a:schemeClr val="lt1"/>
+          </a:fontRef>
+        </p:style>
+        <p:txBody>
+          <a:bodyPr rtlCol="0" anchor="ctr"/>
+          <a:lstStyle/>
+          <a:p>
+            <a:pPr algn="ctr"/>
+            <a:endParaRPr lang="en-US"/>
+          </a:p>
+        </p:txBody>
+      </p:sp>
+      <p:sp>
+        <p:nvSpPr>
+          <p:cNvPr id="21" name="Flèche droite 20"/>
+          <p:cNvSpPr/>
+          <p:nvPr/>
+        </p:nvSpPr>
+        <p:spPr>
+          <a:xfrm rot="11286018">
+            <a:off x="6200774" y="4140292"/>
+            <a:ext cx="1971675" cy="549086"/>
+          </a:xfrm>
+          <a:prstGeom prst="rightArrow">
+            <a:avLst>
+              <a:gd name="adj1" fmla="val 18775"/>
+              <a:gd name="adj2" fmla="val 50000"/>
+            </a:avLst>
+          </a:prstGeom>
+        </p:spPr>
+        <p:style>
+          <a:lnRef idx="2">
+            <a:schemeClr val="accent1">
+              <a:shade val="50000"/>
+            </a:schemeClr>
+          </a:lnRef>
+          <a:fillRef idx="1">
+            <a:schemeClr val="accent1"/>
+          </a:fillRef>
+          <a:effectRef idx="0">
+            <a:schemeClr val="accent1"/>
+          </a:effectRef>
+          <a:fontRef idx="minor">
+            <a:schemeClr val="lt1"/>
+          </a:fontRef>
+        </p:style>
+        <p:txBody>
+          <a:bodyPr rtlCol="0" anchor="ctr"/>
+          <a:lstStyle/>
+          <a:p>
+            <a:pPr algn="ctr"/>
+            <a:endParaRPr lang="en-US"/>
+          </a:p>
+        </p:txBody>
+      </p:sp>
+      <p:sp>
+        <p:nvSpPr>
+          <p:cNvPr id="22" name="Rectangle 21"/>
+          <p:cNvSpPr/>
+          <p:nvPr/>
+        </p:nvSpPr>
+        <p:spPr>
+          <a:xfrm>
+            <a:off x="8739187" y="4114010"/>
+            <a:ext cx="2721677" cy="728840"/>
+          </a:xfrm>
+          <a:prstGeom prst="rect">
+            <a:avLst/>
+          </a:prstGeom>
+          <a:noFill/>
+        </p:spPr>
+        <p:style>
+          <a:lnRef idx="2">
+            <a:schemeClr val="accent1">
+              <a:shade val="50000"/>
+            </a:schemeClr>
+          </a:lnRef>
+          <a:fillRef idx="1">
+            <a:schemeClr val="accent1"/>
+          </a:fillRef>
+          <a:effectRef idx="0">
+            <a:schemeClr val="accent1"/>
+          </a:effectRef>
+          <a:fontRef idx="minor">
+            <a:schemeClr val="lt1"/>
+          </a:fontRef>
+        </p:style>
+        <p:txBody>
+          <a:bodyPr rtlCol="0" anchor="ctr"/>
+          <a:lstStyle/>
+          <a:p>
+            <a:pPr algn="ctr"/>
+            <a:endParaRPr lang="en-US"/>
+          </a:p>
+        </p:txBody>
+      </p:sp>
+    </p:spTree>
+    <p:extLst>
+      <p:ext uri="{BB962C8B-B14F-4D97-AF65-F5344CB8AC3E}">
+        <p14:creationId xmlns:p14="http://schemas.microsoft.com/office/powerpoint/2010/main" val="1597027828"/>
+      </p:ext>
+    </p:extLst>
+  </p:cSld>
+  <p:clrMapOvr>
+    <a:masterClrMapping/>
+  </p:clrMapOvr>
+</p:sld>
+</file>
+
+<file path=ppt/slides/slide12.xml><?xml version="1.0" encoding="utf-8"?>
+<p:sld xmlns:a="http://schemas.openxmlformats.org/drawingml/2006/main" xmlns:r="http://schemas.openxmlformats.org/officeDocument/2006/relationships" xmlns:p="http://schemas.openxmlformats.org/presentationml/2006/main">
+  <p:cSld>
+    <p:spTree>
+      <p:nvGrpSpPr>
+        <p:cNvPr id="1" name=""/>
+        <p:cNvGrpSpPr/>
+        <p:nvPr/>
+      </p:nvGrpSpPr>
+      <p:grpSpPr>
+        <a:xfrm>
+          <a:off x="0" y="0"/>
+          <a:ext cx="0" cy="0"/>
+          <a:chOff x="0" y="0"/>
+          <a:chExt cx="0" cy="0"/>
+        </a:xfrm>
+      </p:grpSpPr>
+      <p:sp>
+        <p:nvSpPr>
+          <p:cNvPr id="2" name="Titre 1"/>
+          <p:cNvSpPr>
+            <a:spLocks noGrp="1"/>
+          </p:cNvSpPr>
+          <p:nvPr>
+            <p:ph type="title"/>
+          </p:nvPr>
+        </p:nvSpPr>
+        <p:spPr/>
+        <p:txBody>
+          <a:bodyPr/>
+          <a:lstStyle/>
+          <a:p>
+            <a:endParaRPr lang="en-US"/>
+          </a:p>
+        </p:txBody>
+      </p:sp>
+      <p:pic>
+        <p:nvPicPr>
+          <p:cNvPr id="4" name="Espace réservé du contenu 3"/>
+          <p:cNvPicPr>
+            <a:picLocks noGrp="1" noChangeAspect="1"/>
+          </p:cNvPicPr>
+          <p:nvPr>
+            <p:ph idx="1"/>
+          </p:nvPr>
+        </p:nvPicPr>
+        <p:blipFill>
+          <a:blip r:embed="rId2">
+            <a:extLst>
+              <a:ext uri="{28A0092B-C50C-407E-A947-70E740481C1C}">
+                <a14:useLocalDpi xmlns:a14="http://schemas.microsoft.com/office/drawing/2010/main" val="0"/>
+              </a:ext>
+            </a:extLst>
+          </a:blip>
+          <a:stretch>
+            <a:fillRect/>
+          </a:stretch>
+        </p:blipFill>
+        <p:spPr>
+          <a:xfrm>
+            <a:off x="5080016" y="1825625"/>
+            <a:ext cx="2031968" cy="4351338"/>
+          </a:xfrm>
+          <a:prstGeom prst="rect">
+            <a:avLst/>
+          </a:prstGeom>
+        </p:spPr>
+      </p:pic>
+    </p:spTree>
+    <p:extLst>
+      <p:ext uri="{BB962C8B-B14F-4D97-AF65-F5344CB8AC3E}">
+        <p14:creationId xmlns:p14="http://schemas.microsoft.com/office/powerpoint/2010/main" val="460135106"/>
+      </p:ext>
+    </p:extLst>
+  </p:cSld>
+  <p:clrMapOvr>
+    <a:masterClrMapping/>
+  </p:clrMapOvr>
+</p:sld>
+</file>
+
 <file path=ppt/slides/slide2.xml><?xml version="1.0" encoding="utf-8"?>
 <p:sld xmlns:a="http://schemas.openxmlformats.org/drawingml/2006/main" xmlns:r="http://schemas.openxmlformats.org/officeDocument/2006/relationships" xmlns:p="http://schemas.openxmlformats.org/presentationml/2006/main">
   <p:cSld>
@@ -3775,7 +4367,7 @@
         </p:nvSpPr>
         <p:spPr>
           <a:xfrm>
-            <a:off x="928918" y="1721882"/>
+            <a:off x="928918" y="2918092"/>
             <a:ext cx="1534844" cy="369332"/>
           </a:xfrm>
           <a:prstGeom prst="rect">
@@ -3846,7 +4438,7 @@
         </p:nvSpPr>
         <p:spPr>
           <a:xfrm>
-            <a:off x="7161959" y="1721882"/>
+            <a:off x="7161959" y="2968383"/>
             <a:ext cx="975011" cy="369332"/>
           </a:xfrm>
           <a:prstGeom prst="rect">
@@ -3912,7 +4504,7 @@
         </p:nvCxnSpPr>
         <p:spPr>
           <a:xfrm>
-            <a:off x="2606466" y="1930837"/>
+            <a:off x="2606465" y="2315398"/>
             <a:ext cx="4132871" cy="0"/>
           </a:xfrm>
           <a:prstGeom prst="straightConnector1">
@@ -3948,7 +4540,7 @@
         </p:nvCxnSpPr>
         <p:spPr>
           <a:xfrm>
-            <a:off x="2606467" y="2510314"/>
+            <a:off x="2606466" y="2761731"/>
             <a:ext cx="4132871" cy="0"/>
           </a:xfrm>
           <a:prstGeom prst="straightConnector1">
@@ -4018,8 +4610,8 @@
         </p:nvSpPr>
         <p:spPr>
           <a:xfrm>
-            <a:off x="3028670" y="1622645"/>
-            <a:ext cx="3358996" cy="369332"/>
+            <a:off x="2946914" y="1918784"/>
+            <a:ext cx="3451971" cy="369332"/>
           </a:xfrm>
           <a:prstGeom prst="rect">
             <a:avLst/>
@@ -4034,7 +4626,11 @@
           <a:p>
             <a:r>
               <a:rPr lang="fr-FR" dirty="0" smtClean="0"/>
-              <a:t>Html (request with no parameter)</a:t>
+              <a:t>HTML (request </a:t>
+            </a:r>
+            <a:r>
+              <a:rPr lang="fr-FR" dirty="0" smtClean="0"/>
+              <a:t>with no parameter)</a:t>
             </a:r>
             <a:endParaRPr lang="en-US" dirty="0"/>
           </a:p>
@@ -4048,8 +4644,8 @@
         </p:nvSpPr>
         <p:spPr>
           <a:xfrm>
-            <a:off x="2828294" y="2198123"/>
-            <a:ext cx="3759747" cy="369332"/>
+            <a:off x="2729598" y="2772197"/>
+            <a:ext cx="3961726" cy="369332"/>
           </a:xfrm>
           <a:prstGeom prst="rect">
             <a:avLst/>
@@ -4064,7 +4660,23 @@
           <a:p>
             <a:r>
               <a:rPr lang="fr-FR" dirty="0" smtClean="0"/>
-              <a:t>Json (with parameter request=upload </a:t>
+              <a:t>JSON (with </a:t>
+            </a:r>
+            <a:r>
+              <a:rPr lang="fr-FR" dirty="0" smtClean="0"/>
+              <a:t>parameter </a:t>
+            </a:r>
+            <a:r>
+              <a:rPr lang="fr-FR" dirty="0" smtClean="0"/>
+              <a:t>request=</a:t>
+            </a:r>
+            <a:r>
+              <a:rPr lang="fr-FR" dirty="0" err="1" smtClean="0"/>
+              <a:t>upload</a:t>
+            </a:r>
+            <a:r>
+              <a:rPr lang="fr-FR" dirty="0" smtClean="0"/>
+              <a:t>)</a:t>
             </a:r>
             <a:endParaRPr lang="en-US" dirty="0"/>
           </a:p>
@@ -4078,7 +4690,7 @@
         </p:nvSpPr>
         <p:spPr>
           <a:xfrm>
-            <a:off x="676275" y="3486150"/>
+            <a:off x="831658" y="4783324"/>
             <a:ext cx="5958362" cy="369332"/>
           </a:xfrm>
           <a:prstGeom prst="rect">
@@ -4112,7 +4724,7 @@
         </p:nvSpPr>
         <p:spPr>
           <a:xfrm>
-            <a:off x="676275" y="4032547"/>
+            <a:off x="861331" y="5135702"/>
             <a:ext cx="7698261" cy="369332"/>
           </a:xfrm>
           <a:prstGeom prst="rect">
@@ -4135,6 +4747,77 @@
               <a:t> 2 : Json la liste des fichiers au format Json sous le répertoire upload    </a:t>
             </a:r>
             <a:endParaRPr lang="en-US" dirty="0"/>
+          </a:p>
+        </p:txBody>
+      </p:sp>
+      <p:sp>
+        <p:nvSpPr>
+          <p:cNvPr id="20" name="Rectangle 19"/>
+          <p:cNvSpPr/>
+          <p:nvPr/>
+        </p:nvSpPr>
+        <p:spPr>
+          <a:xfrm>
+            <a:off x="1168319" y="1401080"/>
+            <a:ext cx="1015525" cy="1100176"/>
+          </a:xfrm>
+          <a:prstGeom prst="rect">
+            <a:avLst/>
+          </a:prstGeom>
+          <a:noFill/>
+        </p:spPr>
+        <p:style>
+          <a:lnRef idx="2">
+            <a:schemeClr val="accent1">
+              <a:shade val="50000"/>
+            </a:schemeClr>
+          </a:lnRef>
+          <a:fillRef idx="1">
+            <a:schemeClr val="accent1"/>
+          </a:fillRef>
+          <a:effectRef idx="0">
+            <a:schemeClr val="accent1"/>
+          </a:effectRef>
+          <a:fontRef idx="minor">
+            <a:schemeClr val="lt1"/>
+          </a:fontRef>
+        </p:style>
+        <p:txBody>
+          <a:bodyPr rtlCol="0" anchor="ctr"/>
+          <a:lstStyle/>
+          <a:p>
+            <a:pPr algn="ctr"/>
+            <a:endParaRPr lang="en-US"/>
+          </a:p>
+        </p:txBody>
+      </p:sp>
+      <p:sp>
+        <p:nvSpPr>
+          <p:cNvPr id="21" name="ZoneTexte 20"/>
+          <p:cNvSpPr txBox="1"/>
+          <p:nvPr/>
+        </p:nvSpPr>
+        <p:spPr>
+          <a:xfrm>
+            <a:off x="1133015" y="2453954"/>
+            <a:ext cx="1086131" cy="307777"/>
+          </a:xfrm>
+          <a:prstGeom prst="rect">
+            <a:avLst/>
+          </a:prstGeom>
+          <a:noFill/>
+        </p:spPr>
+        <p:txBody>
+          <a:bodyPr wrap="none" rtlCol="0">
+            <a:spAutoFit/>
+          </a:bodyPr>
+          <a:lstStyle/>
+          <a:p>
+            <a:r>
+              <a:rPr lang="fr-FR" sz="1400" b="1" dirty="0" smtClean="0"/>
+              <a:t>NanoHTTPD</a:t>
+            </a:r>
+            <a:endParaRPr lang="en-US" sz="1400" b="1" dirty="0"/>
           </a:p>
         </p:txBody>
       </p:sp>
@@ -5524,15 +6207,7 @@
           <a:p>
             <a:r>
               <a:rPr lang="en-US" sz="1400" dirty="0" smtClean="0"/>
-              <a:t>Download Data </a:t>
-            </a:r>
-            <a:r>
-              <a:rPr lang="en-US" sz="1400" dirty="0" smtClean="0"/>
-              <a:t>( + file </a:t>
-            </a:r>
-            <a:r>
-              <a:rPr lang="en-US" sz="1400" dirty="0" smtClean="0"/>
-              <a:t>url)</a:t>
+              <a:t>Download Data ( + file url)</a:t>
             </a:r>
             <a:endParaRPr lang="en-US" sz="1400" dirty="0"/>
           </a:p>
@@ -5682,15 +6357,7 @@
           <a:p>
             <a:r>
               <a:rPr lang="en-US" sz="1400" dirty="0" smtClean="0"/>
-              <a:t>Transfer progress </a:t>
-            </a:r>
-            <a:r>
-              <a:rPr lang="en-US" sz="1400" dirty="0" smtClean="0"/>
-              <a:t>( + file </a:t>
-            </a:r>
-            <a:r>
-              <a:rPr lang="en-US" sz="1400" dirty="0" smtClean="0"/>
-              <a:t>name)</a:t>
+              <a:t>Transfer progress ( + file name)</a:t>
             </a:r>
             <a:endParaRPr lang="en-US" sz="1400" dirty="0"/>
           </a:p>
@@ -6315,94 +6982,422 @@
           <a:chExt cx="0" cy="0"/>
         </a:xfrm>
       </p:grpSpPr>
-      <p:pic>
-        <p:nvPicPr>
-          <p:cNvPr id="4" name="Image 3"/>
-          <p:cNvPicPr>
-            <a:picLocks noChangeAspect="1"/>
-          </p:cNvPicPr>
-          <p:nvPr/>
-        </p:nvPicPr>
-        <p:blipFill>
-          <a:blip r:embed="rId2">
-            <a:extLst>
-              <a:ext uri="{28A0092B-C50C-407E-A947-70E740481C1C}">
-                <a14:useLocalDpi xmlns:a14="http://schemas.microsoft.com/office/drawing/2010/main" val="0"/>
-              </a:ext>
-            </a:extLst>
-          </a:blip>
-          <a:stretch>
-            <a:fillRect/>
-          </a:stretch>
-        </p:blipFill>
-        <p:spPr>
-          <a:xfrm>
-            <a:off x="8562260" y="390525"/>
-            <a:ext cx="2992279" cy="6219825"/>
-          </a:xfrm>
-          <a:prstGeom prst="rect">
-            <a:avLst/>
-          </a:prstGeom>
-        </p:spPr>
-      </p:pic>
-      <p:pic>
-        <p:nvPicPr>
-          <p:cNvPr id="6" name="Image 5"/>
-          <p:cNvPicPr>
-            <a:picLocks noChangeAspect="1"/>
-          </p:cNvPicPr>
-          <p:nvPr/>
-        </p:nvPicPr>
-        <p:blipFill>
-          <a:blip r:embed="rId3">
-            <a:extLst>
-              <a:ext uri="{28A0092B-C50C-407E-A947-70E740481C1C}">
-                <a14:useLocalDpi xmlns:a14="http://schemas.microsoft.com/office/drawing/2010/main" val="0"/>
-              </a:ext>
-            </a:extLst>
-          </a:blip>
-          <a:stretch>
-            <a:fillRect/>
-          </a:stretch>
-        </p:blipFill>
-        <p:spPr>
-          <a:xfrm>
-            <a:off x="4705189" y="390526"/>
-            <a:ext cx="2992279" cy="6219824"/>
-          </a:xfrm>
-          <a:prstGeom prst="rect">
-            <a:avLst/>
-          </a:prstGeom>
-        </p:spPr>
-      </p:pic>
-      <p:pic>
-        <p:nvPicPr>
-          <p:cNvPr id="7" name="Image 6"/>
-          <p:cNvPicPr>
-            <a:picLocks noChangeAspect="1"/>
-          </p:cNvPicPr>
-          <p:nvPr/>
-        </p:nvPicPr>
-        <p:blipFill>
-          <a:blip r:embed="rId4"/>
-          <a:stretch>
-            <a:fillRect/>
-          </a:stretch>
-        </p:blipFill>
-        <p:spPr>
-          <a:xfrm>
-            <a:off x="726621" y="390525"/>
-            <a:ext cx="3009900" cy="6276975"/>
-          </a:xfrm>
-          <a:prstGeom prst="rect">
-            <a:avLst/>
-          </a:prstGeom>
-        </p:spPr>
-      </p:pic>
+      <p:sp>
+        <p:nvSpPr>
+          <p:cNvPr id="4" name="Rectangle 3"/>
+          <p:cNvSpPr/>
+          <p:nvPr/>
+        </p:nvSpPr>
+        <p:spPr>
+          <a:xfrm>
+            <a:off x="1076325" y="504825"/>
+            <a:ext cx="9839325" cy="4619626"/>
+          </a:xfrm>
+          <a:prstGeom prst="rect">
+            <a:avLst/>
+          </a:prstGeom>
+          <a:noFill/>
+        </p:spPr>
+        <p:style>
+          <a:lnRef idx="2">
+            <a:schemeClr val="accent1">
+              <a:shade val="50000"/>
+            </a:schemeClr>
+          </a:lnRef>
+          <a:fillRef idx="1">
+            <a:schemeClr val="accent1"/>
+          </a:fillRef>
+          <a:effectRef idx="0">
+            <a:schemeClr val="accent1"/>
+          </a:effectRef>
+          <a:fontRef idx="minor">
+            <a:schemeClr val="lt1"/>
+          </a:fontRef>
+        </p:style>
+        <p:txBody>
+          <a:bodyPr rtlCol="0" anchor="ctr"/>
+          <a:lstStyle/>
+          <a:p>
+            <a:pPr algn="ctr"/>
+            <a:endParaRPr lang="en-US"/>
+          </a:p>
+        </p:txBody>
+      </p:sp>
+      <p:sp>
+        <p:nvSpPr>
+          <p:cNvPr id="5" name="ZoneTexte 4"/>
+          <p:cNvSpPr txBox="1"/>
+          <p:nvPr/>
+        </p:nvSpPr>
+        <p:spPr>
+          <a:xfrm>
+            <a:off x="4533900" y="666750"/>
+            <a:ext cx="2409186" cy="923330"/>
+          </a:xfrm>
+          <a:prstGeom prst="rect">
+            <a:avLst/>
+          </a:prstGeom>
+          <a:noFill/>
+        </p:spPr>
+        <p:txBody>
+          <a:bodyPr wrap="none" rtlCol="0">
+            <a:spAutoFit/>
+          </a:bodyPr>
+          <a:lstStyle/>
+          <a:p>
+            <a:r>
+              <a:rPr lang="fr-FR" b="1" u="sng" dirty="0" smtClean="0"/>
+              <a:t>Package MyApplication</a:t>
+            </a:r>
+          </a:p>
+          <a:p>
+            <a:endParaRPr lang="fr-FR" b="1" u="sng" dirty="0" smtClean="0"/>
+          </a:p>
+          <a:p>
+            <a:pPr algn="ctr"/>
+            <a:r>
+              <a:rPr lang="fr-FR" dirty="0" smtClean="0"/>
+              <a:t>-MainActivity</a:t>
+            </a:r>
+            <a:endParaRPr lang="en-US" dirty="0"/>
+          </a:p>
+        </p:txBody>
+      </p:sp>
+      <p:sp>
+        <p:nvSpPr>
+          <p:cNvPr id="6" name="Rectangle 5"/>
+          <p:cNvSpPr/>
+          <p:nvPr/>
+        </p:nvSpPr>
+        <p:spPr>
+          <a:xfrm>
+            <a:off x="1428751" y="1894791"/>
+            <a:ext cx="3219450" cy="2647950"/>
+          </a:xfrm>
+          <a:prstGeom prst="rect">
+            <a:avLst/>
+          </a:prstGeom>
+          <a:noFill/>
+        </p:spPr>
+        <p:style>
+          <a:lnRef idx="2">
+            <a:schemeClr val="accent1">
+              <a:shade val="50000"/>
+            </a:schemeClr>
+          </a:lnRef>
+          <a:fillRef idx="1">
+            <a:schemeClr val="accent1"/>
+          </a:fillRef>
+          <a:effectRef idx="0">
+            <a:schemeClr val="accent1"/>
+          </a:effectRef>
+          <a:fontRef idx="minor">
+            <a:schemeClr val="lt1"/>
+          </a:fontRef>
+        </p:style>
+        <p:txBody>
+          <a:bodyPr rtlCol="0" anchor="ctr"/>
+          <a:lstStyle/>
+          <a:p>
+            <a:pPr algn="ctr"/>
+            <a:endParaRPr lang="en-US"/>
+          </a:p>
+        </p:txBody>
+      </p:sp>
+      <p:sp>
+        <p:nvSpPr>
+          <p:cNvPr id="7" name="ZoneTexte 6"/>
+          <p:cNvSpPr txBox="1"/>
+          <p:nvPr/>
+        </p:nvSpPr>
+        <p:spPr>
+          <a:xfrm>
+            <a:off x="2200474" y="2114550"/>
+            <a:ext cx="1256883" cy="369332"/>
+          </a:xfrm>
+          <a:prstGeom prst="rect">
+            <a:avLst/>
+          </a:prstGeom>
+          <a:noFill/>
+        </p:spPr>
+        <p:txBody>
+          <a:bodyPr wrap="none" rtlCol="0">
+            <a:spAutoFit/>
+          </a:bodyPr>
+          <a:lstStyle/>
+          <a:p>
+            <a:pPr algn="ctr"/>
+            <a:r>
+              <a:rPr lang="fr-FR" b="1" u="sng" dirty="0" smtClean="0"/>
+              <a:t>Package </a:t>
+            </a:r>
+            <a:r>
+              <a:rPr lang="fr-FR" b="1" u="sng" dirty="0" smtClean="0"/>
+              <a:t>db</a:t>
+            </a:r>
+            <a:endParaRPr lang="en-US" b="1" u="sng" dirty="0"/>
+          </a:p>
+        </p:txBody>
+      </p:sp>
+      <p:sp>
+        <p:nvSpPr>
+          <p:cNvPr id="8" name="ZoneTexte 7"/>
+          <p:cNvSpPr txBox="1"/>
+          <p:nvPr/>
+        </p:nvSpPr>
+        <p:spPr>
+          <a:xfrm>
+            <a:off x="1643814" y="2688199"/>
+            <a:ext cx="1976695" cy="923330"/>
+          </a:xfrm>
+          <a:prstGeom prst="rect">
+            <a:avLst/>
+          </a:prstGeom>
+          <a:noFill/>
+        </p:spPr>
+        <p:txBody>
+          <a:bodyPr wrap="none" rtlCol="0">
+            <a:spAutoFit/>
+          </a:bodyPr>
+          <a:lstStyle/>
+          <a:p>
+            <a:pPr marL="285750" indent="-285750">
+              <a:buFontTx/>
+              <a:buChar char="-"/>
+            </a:pPr>
+            <a:r>
+              <a:rPr lang="fr-FR" dirty="0" smtClean="0"/>
+              <a:t>DatabaseHelper</a:t>
+            </a:r>
+            <a:endParaRPr lang="fr-FR" dirty="0" smtClean="0"/>
+          </a:p>
+          <a:p>
+            <a:pPr marL="285750" indent="-285750">
+              <a:buFontTx/>
+              <a:buChar char="-"/>
+            </a:pPr>
+            <a:r>
+              <a:rPr lang="fr-FR" dirty="0" smtClean="0"/>
+              <a:t>Connexion</a:t>
+            </a:r>
+            <a:endParaRPr lang="fr-FR" dirty="0"/>
+          </a:p>
+          <a:p>
+            <a:pPr marL="285750" indent="-285750">
+              <a:buFontTx/>
+              <a:buChar char="-"/>
+            </a:pPr>
+            <a:r>
+              <a:rPr lang="fr-FR" dirty="0" smtClean="0"/>
+              <a:t>FileTransfer</a:t>
+            </a:r>
+            <a:endParaRPr lang="fr-FR" dirty="0" smtClean="0"/>
+          </a:p>
+        </p:txBody>
+      </p:sp>
+      <p:sp>
+        <p:nvSpPr>
+          <p:cNvPr id="9" name="Rectangle 8"/>
+          <p:cNvSpPr/>
+          <p:nvPr/>
+        </p:nvSpPr>
+        <p:spPr>
+          <a:xfrm>
+            <a:off x="6888584" y="1894791"/>
+            <a:ext cx="3219450" cy="2647950"/>
+          </a:xfrm>
+          <a:prstGeom prst="rect">
+            <a:avLst/>
+          </a:prstGeom>
+          <a:noFill/>
+        </p:spPr>
+        <p:style>
+          <a:lnRef idx="2">
+            <a:schemeClr val="accent1">
+              <a:shade val="50000"/>
+            </a:schemeClr>
+          </a:lnRef>
+          <a:fillRef idx="1">
+            <a:schemeClr val="accent1"/>
+          </a:fillRef>
+          <a:effectRef idx="0">
+            <a:schemeClr val="accent1"/>
+          </a:effectRef>
+          <a:fontRef idx="minor">
+            <a:schemeClr val="lt1"/>
+          </a:fontRef>
+        </p:style>
+        <p:txBody>
+          <a:bodyPr rtlCol="0" anchor="ctr"/>
+          <a:lstStyle/>
+          <a:p>
+            <a:pPr algn="ctr"/>
+            <a:endParaRPr lang="en-US"/>
+          </a:p>
+        </p:txBody>
+      </p:sp>
+      <p:sp>
+        <p:nvSpPr>
+          <p:cNvPr id="10" name="Rectangle 9"/>
+          <p:cNvSpPr/>
+          <p:nvPr/>
+        </p:nvSpPr>
+        <p:spPr>
+          <a:xfrm>
+            <a:off x="7887501" y="2114550"/>
+            <a:ext cx="1221616" cy="369332"/>
+          </a:xfrm>
+          <a:prstGeom prst="rect">
+            <a:avLst/>
+          </a:prstGeom>
+        </p:spPr>
+        <p:txBody>
+          <a:bodyPr wrap="none">
+            <a:spAutoFit/>
+          </a:bodyPr>
+          <a:lstStyle/>
+          <a:p>
+            <a:pPr algn="ctr"/>
+            <a:r>
+              <a:rPr lang="fr-FR" b="1" u="sng" dirty="0"/>
+              <a:t>Package </a:t>
+            </a:r>
+            <a:r>
+              <a:rPr lang="fr-FR" b="1" u="sng" dirty="0" smtClean="0"/>
+              <a:t>UI</a:t>
+            </a:r>
+            <a:endParaRPr lang="en-US" b="1" u="sng" dirty="0"/>
+          </a:p>
+        </p:txBody>
+      </p:sp>
+      <p:sp>
+        <p:nvSpPr>
+          <p:cNvPr id="11" name="Rectangle 10"/>
+          <p:cNvSpPr/>
+          <p:nvPr/>
+        </p:nvSpPr>
+        <p:spPr>
+          <a:xfrm>
+            <a:off x="7290854" y="2688199"/>
+            <a:ext cx="2414910" cy="1276350"/>
+          </a:xfrm>
+          <a:prstGeom prst="rect">
+            <a:avLst/>
+          </a:prstGeom>
+          <a:noFill/>
+        </p:spPr>
+        <p:style>
+          <a:lnRef idx="2">
+            <a:schemeClr val="accent1">
+              <a:shade val="50000"/>
+            </a:schemeClr>
+          </a:lnRef>
+          <a:fillRef idx="1">
+            <a:schemeClr val="accent1"/>
+          </a:fillRef>
+          <a:effectRef idx="0">
+            <a:schemeClr val="accent1"/>
+          </a:effectRef>
+          <a:fontRef idx="minor">
+            <a:schemeClr val="lt1"/>
+          </a:fontRef>
+        </p:style>
+        <p:txBody>
+          <a:bodyPr rtlCol="0" anchor="ctr"/>
+          <a:lstStyle/>
+          <a:p>
+            <a:pPr algn="ctr"/>
+            <a:endParaRPr lang="en-US"/>
+          </a:p>
+        </p:txBody>
+      </p:sp>
+      <p:sp>
+        <p:nvSpPr>
+          <p:cNvPr id="12" name="Rectangle 11"/>
+          <p:cNvSpPr/>
+          <p:nvPr/>
+        </p:nvSpPr>
+        <p:spPr>
+          <a:xfrm>
+            <a:off x="7767727" y="2725519"/>
+            <a:ext cx="1461169" cy="338554"/>
+          </a:xfrm>
+          <a:prstGeom prst="rect">
+            <a:avLst/>
+          </a:prstGeom>
+        </p:spPr>
+        <p:txBody>
+          <a:bodyPr wrap="none">
+            <a:spAutoFit/>
+          </a:bodyPr>
+          <a:lstStyle/>
+          <a:p>
+            <a:pPr algn="ctr"/>
+            <a:r>
+              <a:rPr lang="fr-FR" sz="1600" b="1" u="sng" dirty="0" smtClean="0"/>
+              <a:t>Administration</a:t>
+            </a:r>
+            <a:endParaRPr lang="en-US" sz="1600" b="1" u="sng" dirty="0"/>
+          </a:p>
+        </p:txBody>
+      </p:sp>
+      <p:sp>
+        <p:nvSpPr>
+          <p:cNvPr id="13" name="ZoneTexte 12"/>
+          <p:cNvSpPr txBox="1"/>
+          <p:nvPr/>
+        </p:nvSpPr>
+        <p:spPr>
+          <a:xfrm>
+            <a:off x="7290854" y="3134475"/>
+            <a:ext cx="2934067" cy="584775"/>
+          </a:xfrm>
+          <a:prstGeom prst="rect">
+            <a:avLst/>
+          </a:prstGeom>
+          <a:noFill/>
+        </p:spPr>
+        <p:txBody>
+          <a:bodyPr wrap="square" rtlCol="0">
+            <a:spAutoFit/>
+          </a:bodyPr>
+          <a:lstStyle/>
+          <a:p>
+            <a:r>
+              <a:rPr lang="fr-FR" sz="1600" dirty="0" smtClean="0"/>
+              <a:t>- </a:t>
+            </a:r>
+            <a:r>
+              <a:rPr lang="fr-FR" sz="1600" dirty="0" smtClean="0"/>
+              <a:t>Administration</a:t>
+            </a:r>
+            <a:r>
+              <a:rPr lang="fr-FR" sz="1600" dirty="0" smtClean="0"/>
+              <a:t>Fragment</a:t>
+            </a:r>
+            <a:endParaRPr lang="fr-FR" sz="1600" dirty="0" smtClean="0"/>
+          </a:p>
+          <a:p>
+            <a:r>
+              <a:rPr lang="fr-FR" sz="1600" dirty="0" smtClean="0"/>
+              <a:t>- </a:t>
+            </a:r>
+            <a:r>
+              <a:rPr lang="fr-FR" sz="1600" dirty="0" smtClean="0"/>
+              <a:t>Administration</a:t>
+            </a:r>
+            <a:r>
+              <a:rPr lang="fr-FR" sz="1600" dirty="0" smtClean="0"/>
+              <a:t>ViewModel</a:t>
+            </a:r>
+            <a:endParaRPr lang="en-US" sz="1600" dirty="0"/>
+          </a:p>
+        </p:txBody>
+      </p:sp>
     </p:spTree>
     <p:extLst>
       <p:ext uri="{BB962C8B-B14F-4D97-AF65-F5344CB8AC3E}">
-        <p14:creationId xmlns:p14="http://schemas.microsoft.com/office/powerpoint/2010/main" val="2249519501"/>
+        <p14:creationId xmlns:p14="http://schemas.microsoft.com/office/powerpoint/2010/main" val="1545914156"/>
       </p:ext>
     </p:extLst>
   </p:cSld>
@@ -6451,8 +7446,8 @@
         </p:blipFill>
         <p:spPr>
           <a:xfrm>
-            <a:off x="8765017" y="108857"/>
-            <a:ext cx="3189320" cy="6629400"/>
+            <a:off x="8562260" y="390525"/>
+            <a:ext cx="2992279" cy="6219825"/>
           </a:xfrm>
           <a:prstGeom prst="rect">
             <a:avLst/>
@@ -6461,7 +7456,7 @@
       </p:pic>
       <p:pic>
         <p:nvPicPr>
-          <p:cNvPr id="5" name="Image 4"/>
+          <p:cNvPr id="6" name="Image 5"/>
           <p:cNvPicPr>
             <a:picLocks noChangeAspect="1"/>
           </p:cNvPicPr>
@@ -6481,8 +7476,8 @@
         </p:blipFill>
         <p:spPr>
           <a:xfrm>
-            <a:off x="859267" y="108857"/>
-            <a:ext cx="3189320" cy="6629400"/>
+            <a:off x="4705189" y="390526"/>
+            <a:ext cx="2992279" cy="6219824"/>
           </a:xfrm>
           <a:prstGeom prst="rect">
             <a:avLst/>
@@ -6491,28 +7486,22 @@
       </p:pic>
       <p:pic>
         <p:nvPicPr>
-          <p:cNvPr id="6" name="Image 5"/>
+          <p:cNvPr id="7" name="Image 6"/>
           <p:cNvPicPr>
             <a:picLocks noChangeAspect="1"/>
           </p:cNvPicPr>
           <p:nvPr/>
         </p:nvPicPr>
         <p:blipFill>
-          <a:blip r:embed="rId4">
-            <a:extLst>
-              <a:ext uri="{28A0092B-C50C-407E-A947-70E740481C1C}">
-                <a14:useLocalDpi xmlns:a14="http://schemas.microsoft.com/office/drawing/2010/main" val="0"/>
-              </a:ext>
-            </a:extLst>
-          </a:blip>
+          <a:blip r:embed="rId4"/>
           <a:stretch>
             <a:fillRect/>
           </a:stretch>
         </p:blipFill>
         <p:spPr>
           <a:xfrm>
-            <a:off x="4812142" y="108857"/>
-            <a:ext cx="3189320" cy="6629400"/>
+            <a:off x="726621" y="390525"/>
+            <a:ext cx="3009900" cy="6276975"/>
           </a:xfrm>
           <a:prstGeom prst="rect">
             <a:avLst/>
@@ -6522,7 +7511,7 @@
     </p:spTree>
     <p:extLst>
       <p:ext uri="{BB962C8B-B14F-4D97-AF65-F5344CB8AC3E}">
-        <p14:creationId xmlns:p14="http://schemas.microsoft.com/office/powerpoint/2010/main" val="4186189739"/>
+        <p14:creationId xmlns:p14="http://schemas.microsoft.com/office/powerpoint/2010/main" val="2249519501"/>
       </p:ext>
     </p:extLst>
   </p:cSld>
@@ -6571,8 +7560,8 @@
         </p:blipFill>
         <p:spPr>
           <a:xfrm>
-            <a:off x="817326" y="0"/>
-            <a:ext cx="3299297" cy="6858000"/>
+            <a:off x="8765017" y="108857"/>
+            <a:ext cx="3189320" cy="6629400"/>
           </a:xfrm>
           <a:prstGeom prst="rect">
             <a:avLst/>
@@ -6601,8 +7590,8 @@
         </p:blipFill>
         <p:spPr>
           <a:xfrm>
-            <a:off x="8374384" y="-1"/>
-            <a:ext cx="3284216" cy="6826653"/>
+            <a:off x="859267" y="108857"/>
+            <a:ext cx="3189320" cy="6629400"/>
           </a:xfrm>
           <a:prstGeom prst="rect">
             <a:avLst/>
@@ -6631,8 +7620,8 @@
         </p:blipFill>
         <p:spPr>
           <a:xfrm>
-            <a:off x="4517313" y="0"/>
-            <a:ext cx="3284216" cy="6826652"/>
+            <a:off x="4812142" y="108857"/>
+            <a:ext cx="3189320" cy="6629400"/>
           </a:xfrm>
           <a:prstGeom prst="rect">
             <a:avLst/>
@@ -6642,7 +7631,7 @@
     </p:spTree>
     <p:extLst>
       <p:ext uri="{BB962C8B-B14F-4D97-AF65-F5344CB8AC3E}">
-        <p14:creationId xmlns:p14="http://schemas.microsoft.com/office/powerpoint/2010/main" val="237931984"/>
+        <p14:creationId xmlns:p14="http://schemas.microsoft.com/office/powerpoint/2010/main" val="4186189739"/>
       </p:ext>
     </p:extLst>
   </p:cSld>

</xml_diff>

<commit_message>
- Updating the intership report in version word ,PDF and PPT
</commit_message>
<xml_diff>
--- a/Présentation_image.pptx
+++ b/Présentation_image.pptx
@@ -254,7 +254,7 @@
           <a:p>
             <a:fld id="{6D53E27C-41F9-477C-981C-F16B615EFA3D}" type="datetimeFigureOut">
               <a:rPr lang="en-US" smtClean="0"/>
-              <a:t>9/29/2021</a:t>
+              <a:t>10/6/2021</a:t>
             </a:fld>
             <a:endParaRPr lang="en-US"/>
           </a:p>
@@ -424,7 +424,7 @@
           <a:p>
             <a:fld id="{6D53E27C-41F9-477C-981C-F16B615EFA3D}" type="datetimeFigureOut">
               <a:rPr lang="en-US" smtClean="0"/>
-              <a:t>9/29/2021</a:t>
+              <a:t>10/6/2021</a:t>
             </a:fld>
             <a:endParaRPr lang="en-US"/>
           </a:p>
@@ -604,7 +604,7 @@
           <a:p>
             <a:fld id="{6D53E27C-41F9-477C-981C-F16B615EFA3D}" type="datetimeFigureOut">
               <a:rPr lang="en-US" smtClean="0"/>
-              <a:t>9/29/2021</a:t>
+              <a:t>10/6/2021</a:t>
             </a:fld>
             <a:endParaRPr lang="en-US"/>
           </a:p>
@@ -774,7 +774,7 @@
           <a:p>
             <a:fld id="{6D53E27C-41F9-477C-981C-F16B615EFA3D}" type="datetimeFigureOut">
               <a:rPr lang="en-US" smtClean="0"/>
-              <a:t>9/29/2021</a:t>
+              <a:t>10/6/2021</a:t>
             </a:fld>
             <a:endParaRPr lang="en-US"/>
           </a:p>
@@ -1020,7 +1020,7 @@
           <a:p>
             <a:fld id="{6D53E27C-41F9-477C-981C-F16B615EFA3D}" type="datetimeFigureOut">
               <a:rPr lang="en-US" smtClean="0"/>
-              <a:t>9/29/2021</a:t>
+              <a:t>10/6/2021</a:t>
             </a:fld>
             <a:endParaRPr lang="en-US"/>
           </a:p>
@@ -1252,7 +1252,7 @@
           <a:p>
             <a:fld id="{6D53E27C-41F9-477C-981C-F16B615EFA3D}" type="datetimeFigureOut">
               <a:rPr lang="en-US" smtClean="0"/>
-              <a:t>9/29/2021</a:t>
+              <a:t>10/6/2021</a:t>
             </a:fld>
             <a:endParaRPr lang="en-US"/>
           </a:p>
@@ -1619,7 +1619,7 @@
           <a:p>
             <a:fld id="{6D53E27C-41F9-477C-981C-F16B615EFA3D}" type="datetimeFigureOut">
               <a:rPr lang="en-US" smtClean="0"/>
-              <a:t>9/29/2021</a:t>
+              <a:t>10/6/2021</a:t>
             </a:fld>
             <a:endParaRPr lang="en-US"/>
           </a:p>
@@ -1737,7 +1737,7 @@
           <a:p>
             <a:fld id="{6D53E27C-41F9-477C-981C-F16B615EFA3D}" type="datetimeFigureOut">
               <a:rPr lang="en-US" smtClean="0"/>
-              <a:t>9/29/2021</a:t>
+              <a:t>10/6/2021</a:t>
             </a:fld>
             <a:endParaRPr lang="en-US"/>
           </a:p>
@@ -1832,7 +1832,7 @@
           <a:p>
             <a:fld id="{6D53E27C-41F9-477C-981C-F16B615EFA3D}" type="datetimeFigureOut">
               <a:rPr lang="en-US" smtClean="0"/>
-              <a:t>9/29/2021</a:t>
+              <a:t>10/6/2021</a:t>
             </a:fld>
             <a:endParaRPr lang="en-US"/>
           </a:p>
@@ -2109,7 +2109,7 @@
           <a:p>
             <a:fld id="{6D53E27C-41F9-477C-981C-F16B615EFA3D}" type="datetimeFigureOut">
               <a:rPr lang="en-US" smtClean="0"/>
-              <a:t>9/29/2021</a:t>
+              <a:t>10/6/2021</a:t>
             </a:fld>
             <a:endParaRPr lang="en-US"/>
           </a:p>
@@ -2362,7 +2362,7 @@
           <a:p>
             <a:fld id="{6D53E27C-41F9-477C-981C-F16B615EFA3D}" type="datetimeFigureOut">
               <a:rPr lang="en-US" smtClean="0"/>
-              <a:t>9/29/2021</a:t>
+              <a:t>10/6/2021</a:t>
             </a:fld>
             <a:endParaRPr lang="en-US"/>
           </a:p>
@@ -2575,7 +2575,7 @@
           <a:p>
             <a:fld id="{6D53E27C-41F9-477C-981C-F16B615EFA3D}" type="datetimeFigureOut">
               <a:rPr lang="en-US" smtClean="0"/>
-              <a:t>9/29/2021</a:t>
+              <a:t>10/6/2021</a:t>
             </a:fld>
             <a:endParaRPr lang="en-US"/>
           </a:p>
@@ -4626,11 +4626,7 @@
           <a:p>
             <a:r>
               <a:rPr lang="fr-FR" dirty="0" smtClean="0"/>
-              <a:t>HTML (request </a:t>
-            </a:r>
-            <a:r>
-              <a:rPr lang="fr-FR" dirty="0" smtClean="0"/>
-              <a:t>with no parameter)</a:t>
+              <a:t>HTML (request with no parameter)</a:t>
             </a:r>
             <a:endParaRPr lang="en-US" dirty="0"/>
           </a:p>
@@ -4660,15 +4656,7 @@
           <a:p>
             <a:r>
               <a:rPr lang="fr-FR" dirty="0" smtClean="0"/>
-              <a:t>JSON (with </a:t>
-            </a:r>
-            <a:r>
-              <a:rPr lang="fr-FR" dirty="0" smtClean="0"/>
-              <a:t>parameter </a:t>
-            </a:r>
-            <a:r>
-              <a:rPr lang="fr-FR" dirty="0" smtClean="0"/>
-              <a:t>request=</a:t>
+              <a:t>JSON (with parameter request=</a:t>
             </a:r>
             <a:r>
               <a:rPr lang="fr-FR" dirty="0" err="1" smtClean="0"/>
@@ -6551,8 +6539,8 @@
         </p:nvSpPr>
         <p:spPr>
           <a:xfrm>
-            <a:off x="1076325" y="504825"/>
-            <a:ext cx="9839325" cy="4619626"/>
+            <a:off x="1478422" y="457857"/>
+            <a:ext cx="9462865" cy="4619626"/>
           </a:xfrm>
           <a:prstGeom prst="rect">
             <a:avLst/>
@@ -6632,8 +6620,8 @@
         </p:nvSpPr>
         <p:spPr>
           <a:xfrm>
-            <a:off x="1428751" y="1894791"/>
-            <a:ext cx="3219450" cy="2647950"/>
+            <a:off x="4862557" y="2050991"/>
+            <a:ext cx="2722682" cy="2491750"/>
           </a:xfrm>
           <a:prstGeom prst="rect">
             <a:avLst/>
@@ -6673,7 +6661,7 @@
         </p:nvSpPr>
         <p:spPr>
           <a:xfrm>
-            <a:off x="2110449" y="2114550"/>
+            <a:off x="5517453" y="2100595"/>
             <a:ext cx="1436933" cy="369332"/>
           </a:xfrm>
           <a:prstGeom prst="rect">
@@ -6704,7 +6692,7 @@
         </p:nvSpPr>
         <p:spPr>
           <a:xfrm>
-            <a:off x="1643814" y="2688199"/>
+            <a:off x="5131854" y="2767670"/>
             <a:ext cx="2370201" cy="1477328"/>
           </a:xfrm>
           <a:prstGeom prst="rect">
@@ -6778,8 +6766,8 @@
         </p:nvSpPr>
         <p:spPr>
           <a:xfrm>
-            <a:off x="6888584" y="1894791"/>
-            <a:ext cx="3219450" cy="2647950"/>
+            <a:off x="7776673" y="2050991"/>
+            <a:ext cx="2963750" cy="2491750"/>
           </a:xfrm>
           <a:prstGeom prst="rect">
             <a:avLst/>
@@ -6819,7 +6807,7 @@
         </p:nvSpPr>
         <p:spPr>
           <a:xfrm>
-            <a:off x="7887501" y="2114550"/>
+            <a:off x="8793355" y="2091953"/>
             <a:ext cx="1221616" cy="369332"/>
           </a:xfrm>
           <a:prstGeom prst="rect">
@@ -6853,8 +6841,8 @@
         </p:nvSpPr>
         <p:spPr>
           <a:xfrm>
-            <a:off x="7290854" y="2688199"/>
-            <a:ext cx="2414910" cy="1276350"/>
+            <a:off x="8134475" y="2688199"/>
+            <a:ext cx="2248145" cy="1239030"/>
           </a:xfrm>
           <a:prstGeom prst="rect">
             <a:avLst/>
@@ -6894,7 +6882,7 @@
         </p:nvSpPr>
         <p:spPr>
           <a:xfrm>
-            <a:off x="7923474" y="2725519"/>
+            <a:off x="8683710" y="2727298"/>
             <a:ext cx="1149674" cy="338554"/>
           </a:xfrm>
           <a:prstGeom prst="rect">
@@ -6924,7 +6912,7 @@
         </p:nvSpPr>
         <p:spPr>
           <a:xfrm>
-            <a:off x="7457619" y="3101393"/>
+            <a:off x="8203785" y="3075597"/>
             <a:ext cx="2400755" cy="584775"/>
           </a:xfrm>
           <a:prstGeom prst="rect">
@@ -6949,6 +6937,136 @@
               <a:t>- FiletransferViewModel</a:t>
             </a:r>
             <a:endParaRPr lang="en-US" sz="1600" dirty="0"/>
+          </a:p>
+        </p:txBody>
+      </p:sp>
+      <p:sp>
+        <p:nvSpPr>
+          <p:cNvPr id="13" name="Rectangle 12"/>
+          <p:cNvSpPr/>
+          <p:nvPr/>
+        </p:nvSpPr>
+        <p:spPr>
+          <a:xfrm>
+            <a:off x="1812427" y="2050991"/>
+            <a:ext cx="2722682" cy="2491750"/>
+          </a:xfrm>
+          <a:prstGeom prst="rect">
+            <a:avLst/>
+          </a:prstGeom>
+          <a:noFill/>
+        </p:spPr>
+        <p:style>
+          <a:lnRef idx="2">
+            <a:schemeClr val="accent1">
+              <a:shade val="50000"/>
+            </a:schemeClr>
+          </a:lnRef>
+          <a:fillRef idx="1">
+            <a:schemeClr val="accent1"/>
+          </a:fillRef>
+          <a:effectRef idx="0">
+            <a:schemeClr val="accent1"/>
+          </a:effectRef>
+          <a:fontRef idx="minor">
+            <a:schemeClr val="lt1"/>
+          </a:fontRef>
+        </p:style>
+        <p:txBody>
+          <a:bodyPr rtlCol="0" anchor="ctr"/>
+          <a:lstStyle/>
+          <a:p>
+            <a:pPr algn="ctr"/>
+            <a:endParaRPr lang="en-US"/>
+          </a:p>
+        </p:txBody>
+      </p:sp>
+      <p:sp>
+        <p:nvSpPr>
+          <p:cNvPr id="15" name="ZoneTexte 14"/>
+          <p:cNvSpPr txBox="1"/>
+          <p:nvPr/>
+        </p:nvSpPr>
+        <p:spPr>
+          <a:xfrm>
+            <a:off x="2530899" y="2100595"/>
+            <a:ext cx="1285737" cy="369332"/>
+          </a:xfrm>
+          <a:prstGeom prst="rect">
+            <a:avLst/>
+          </a:prstGeom>
+          <a:noFill/>
+        </p:spPr>
+        <p:txBody>
+          <a:bodyPr wrap="none" rtlCol="0">
+            <a:spAutoFit/>
+          </a:bodyPr>
+          <a:lstStyle/>
+          <a:p>
+            <a:pPr algn="ctr"/>
+            <a:r>
+              <a:rPr lang="fr-FR" b="1" u="sng" dirty="0" smtClean="0"/>
+              <a:t>Package </a:t>
+            </a:r>
+            <a:r>
+              <a:rPr lang="fr-FR" b="1" u="sng" dirty="0" smtClean="0"/>
+              <a:t>DB</a:t>
+            </a:r>
+            <a:endParaRPr lang="en-US" b="1" u="sng" dirty="0"/>
+          </a:p>
+        </p:txBody>
+      </p:sp>
+      <p:sp>
+        <p:nvSpPr>
+          <p:cNvPr id="16" name="ZoneTexte 15"/>
+          <p:cNvSpPr txBox="1"/>
+          <p:nvPr/>
+        </p:nvSpPr>
+        <p:spPr>
+          <a:xfrm>
+            <a:off x="2071095" y="2846049"/>
+            <a:ext cx="1976695" cy="923330"/>
+          </a:xfrm>
+          <a:prstGeom prst="rect">
+            <a:avLst/>
+          </a:prstGeom>
+          <a:noFill/>
+        </p:spPr>
+        <p:txBody>
+          <a:bodyPr wrap="none" rtlCol="0">
+            <a:spAutoFit/>
+          </a:bodyPr>
+          <a:lstStyle/>
+          <a:p>
+            <a:pPr marL="285750" indent="-285750">
+              <a:buFontTx/>
+              <a:buChar char="-"/>
+            </a:pPr>
+            <a:r>
+              <a:rPr lang="fr-FR" dirty="0" smtClean="0"/>
+              <a:t>DatabaseHelper</a:t>
+            </a:r>
+          </a:p>
+          <a:p>
+            <a:pPr marL="285750" indent="-285750">
+              <a:buFontTx/>
+              <a:buChar char="-"/>
+            </a:pPr>
+            <a:r>
+              <a:rPr lang="fr-FR" dirty="0" smtClean="0"/>
+              <a:t>Connexion</a:t>
+            </a:r>
+            <a:endParaRPr lang="fr-FR" dirty="0"/>
+          </a:p>
+          <a:p>
+            <a:pPr marL="285750" indent="-285750">
+              <a:buFontTx/>
+              <a:buChar char="-"/>
+            </a:pPr>
+            <a:r>
+              <a:rPr lang="fr-FR" dirty="0" smtClean="0"/>
+              <a:t>FileTransfer</a:t>
+            </a:r>
           </a:p>
         </p:txBody>
       </p:sp>
@@ -7112,8 +7230,8 @@
         </p:nvSpPr>
         <p:spPr>
           <a:xfrm>
-            <a:off x="2200474" y="2114550"/>
-            <a:ext cx="1256883" cy="369332"/>
+            <a:off x="2186047" y="2114550"/>
+            <a:ext cx="1285737" cy="369332"/>
           </a:xfrm>
           <a:prstGeom prst="rect">
             <a:avLst/>
@@ -7133,7 +7251,7 @@
             </a:r>
             <a:r>
               <a:rPr lang="fr-FR" b="1" u="sng" dirty="0" smtClean="0"/>
-              <a:t>db</a:t>
+              <a:t>DB</a:t>
             </a:r>
             <a:endParaRPr lang="en-US" b="1" u="sng" dirty="0"/>
           </a:p>
@@ -7169,7 +7287,6 @@
               <a:rPr lang="fr-FR" dirty="0" smtClean="0"/>
               <a:t>DatabaseHelper</a:t>
             </a:r>
-            <a:endParaRPr lang="fr-FR" dirty="0" smtClean="0"/>
           </a:p>
           <a:p>
             <a:pPr marL="285750" indent="-285750">
@@ -7191,7 +7308,6 @@
               <a:rPr lang="fr-FR" dirty="0" smtClean="0"/>
               <a:t>FileTransfer</a:t>
             </a:r>
-            <a:endParaRPr lang="fr-FR" dirty="0" smtClean="0"/>
           </a:p>
         </p:txBody>
       </p:sp>
@@ -7365,30 +7481,13 @@
           <a:p>
             <a:r>
               <a:rPr lang="fr-FR" sz="1600" dirty="0" smtClean="0"/>
-              <a:t>- </a:t>
-            </a:r>
+              <a:t>- AdministrationFragment</a:t>
+            </a:r>
+          </a:p>
+          <a:p>
             <a:r>
               <a:rPr lang="fr-FR" sz="1600" dirty="0" smtClean="0"/>
-              <a:t>Administration</a:t>
-            </a:r>
-            <a:r>
-              <a:rPr lang="fr-FR" sz="1600" dirty="0" smtClean="0"/>
-              <a:t>Fragment</a:t>
-            </a:r>
-            <a:endParaRPr lang="fr-FR" sz="1600" dirty="0" smtClean="0"/>
-          </a:p>
-          <a:p>
-            <a:r>
-              <a:rPr lang="fr-FR" sz="1600" dirty="0" smtClean="0"/>
-              <a:t>- </a:t>
-            </a:r>
-            <a:r>
-              <a:rPr lang="fr-FR" sz="1600" dirty="0" smtClean="0"/>
-              <a:t>Administration</a:t>
-            </a:r>
-            <a:r>
-              <a:rPr lang="fr-FR" sz="1600" dirty="0" smtClean="0"/>
-              <a:t>ViewModel</a:t>
+              <a:t>- AdministrationViewModel</a:t>
             </a:r>
             <a:endParaRPr lang="en-US" sz="1600" dirty="0"/>
           </a:p>

</xml_diff>

<commit_message>
- Updating the intership repport in version Word and PDF and the presentation PPT
</commit_message>
<xml_diff>
--- a/Présentation_image.pptx
+++ b/Présentation_image.pptx
@@ -17,6 +17,7 @@
     <p:sldId id="264" r:id="rId11"/>
     <p:sldId id="266" r:id="rId12"/>
     <p:sldId id="267" r:id="rId13"/>
+    <p:sldId id="268" r:id="rId14"/>
   </p:sldIdLst>
   <p:sldSz cx="12192000" cy="6858000"/>
   <p:notesSz cx="6858000" cy="9144000"/>
@@ -254,7 +255,7 @@
           <a:p>
             <a:fld id="{6D53E27C-41F9-477C-981C-F16B615EFA3D}" type="datetimeFigureOut">
               <a:rPr lang="en-US" smtClean="0"/>
-              <a:t>10/6/2021</a:t>
+              <a:t>10/8/2021</a:t>
             </a:fld>
             <a:endParaRPr lang="en-US"/>
           </a:p>
@@ -424,7 +425,7 @@
           <a:p>
             <a:fld id="{6D53E27C-41F9-477C-981C-F16B615EFA3D}" type="datetimeFigureOut">
               <a:rPr lang="en-US" smtClean="0"/>
-              <a:t>10/6/2021</a:t>
+              <a:t>10/8/2021</a:t>
             </a:fld>
             <a:endParaRPr lang="en-US"/>
           </a:p>
@@ -604,7 +605,7 @@
           <a:p>
             <a:fld id="{6D53E27C-41F9-477C-981C-F16B615EFA3D}" type="datetimeFigureOut">
               <a:rPr lang="en-US" smtClean="0"/>
-              <a:t>10/6/2021</a:t>
+              <a:t>10/8/2021</a:t>
             </a:fld>
             <a:endParaRPr lang="en-US"/>
           </a:p>
@@ -774,7 +775,7 @@
           <a:p>
             <a:fld id="{6D53E27C-41F9-477C-981C-F16B615EFA3D}" type="datetimeFigureOut">
               <a:rPr lang="en-US" smtClean="0"/>
-              <a:t>10/6/2021</a:t>
+              <a:t>10/8/2021</a:t>
             </a:fld>
             <a:endParaRPr lang="en-US"/>
           </a:p>
@@ -1020,7 +1021,7 @@
           <a:p>
             <a:fld id="{6D53E27C-41F9-477C-981C-F16B615EFA3D}" type="datetimeFigureOut">
               <a:rPr lang="en-US" smtClean="0"/>
-              <a:t>10/6/2021</a:t>
+              <a:t>10/8/2021</a:t>
             </a:fld>
             <a:endParaRPr lang="en-US"/>
           </a:p>
@@ -1252,7 +1253,7 @@
           <a:p>
             <a:fld id="{6D53E27C-41F9-477C-981C-F16B615EFA3D}" type="datetimeFigureOut">
               <a:rPr lang="en-US" smtClean="0"/>
-              <a:t>10/6/2021</a:t>
+              <a:t>10/8/2021</a:t>
             </a:fld>
             <a:endParaRPr lang="en-US"/>
           </a:p>
@@ -1619,7 +1620,7 @@
           <a:p>
             <a:fld id="{6D53E27C-41F9-477C-981C-F16B615EFA3D}" type="datetimeFigureOut">
               <a:rPr lang="en-US" smtClean="0"/>
-              <a:t>10/6/2021</a:t>
+              <a:t>10/8/2021</a:t>
             </a:fld>
             <a:endParaRPr lang="en-US"/>
           </a:p>
@@ -1737,7 +1738,7 @@
           <a:p>
             <a:fld id="{6D53E27C-41F9-477C-981C-F16B615EFA3D}" type="datetimeFigureOut">
               <a:rPr lang="en-US" smtClean="0"/>
-              <a:t>10/6/2021</a:t>
+              <a:t>10/8/2021</a:t>
             </a:fld>
             <a:endParaRPr lang="en-US"/>
           </a:p>
@@ -1832,7 +1833,7 @@
           <a:p>
             <a:fld id="{6D53E27C-41F9-477C-981C-F16B615EFA3D}" type="datetimeFigureOut">
               <a:rPr lang="en-US" smtClean="0"/>
-              <a:t>10/6/2021</a:t>
+              <a:t>10/8/2021</a:t>
             </a:fld>
             <a:endParaRPr lang="en-US"/>
           </a:p>
@@ -2109,7 +2110,7 @@
           <a:p>
             <a:fld id="{6D53E27C-41F9-477C-981C-F16B615EFA3D}" type="datetimeFigureOut">
               <a:rPr lang="en-US" smtClean="0"/>
-              <a:t>10/6/2021</a:t>
+              <a:t>10/8/2021</a:t>
             </a:fld>
             <a:endParaRPr lang="en-US"/>
           </a:p>
@@ -2362,7 +2363,7 @@
           <a:p>
             <a:fld id="{6D53E27C-41F9-477C-981C-F16B615EFA3D}" type="datetimeFigureOut">
               <a:rPr lang="en-US" smtClean="0"/>
-              <a:t>10/6/2021</a:t>
+              <a:t>10/8/2021</a:t>
             </a:fld>
             <a:endParaRPr lang="en-US"/>
           </a:p>
@@ -2575,7 +2576,7 @@
           <a:p>
             <a:fld id="{6D53E27C-41F9-477C-981C-F16B615EFA3D}" type="datetimeFigureOut">
               <a:rPr lang="en-US" smtClean="0"/>
-              <a:t>10/6/2021</a:t>
+              <a:t>10/8/2021</a:t>
             </a:fld>
             <a:endParaRPr lang="en-US"/>
           </a:p>
@@ -4301,6 +4302,92 @@
 </p:sld>
 </file>
 
+<file path=ppt/slides/slide13.xml><?xml version="1.0" encoding="utf-8"?>
+<p:sld xmlns:a="http://schemas.openxmlformats.org/drawingml/2006/main" xmlns:r="http://schemas.openxmlformats.org/officeDocument/2006/relationships" xmlns:p="http://schemas.openxmlformats.org/presentationml/2006/main">
+  <p:cSld>
+    <p:spTree>
+      <p:nvGrpSpPr>
+        <p:cNvPr id="1" name=""/>
+        <p:cNvGrpSpPr/>
+        <p:nvPr/>
+      </p:nvGrpSpPr>
+      <p:grpSpPr>
+        <a:xfrm>
+          <a:off x="0" y="0"/>
+          <a:ext cx="0" cy="0"/>
+          <a:chOff x="0" y="0"/>
+          <a:chExt cx="0" cy="0"/>
+        </a:xfrm>
+      </p:grpSpPr>
+      <p:sp>
+        <p:nvSpPr>
+          <p:cNvPr id="2" name="Titre 1"/>
+          <p:cNvSpPr>
+            <a:spLocks noGrp="1"/>
+          </p:cNvSpPr>
+          <p:nvPr>
+            <p:ph type="title"/>
+          </p:nvPr>
+        </p:nvSpPr>
+        <p:spPr/>
+        <p:txBody>
+          <a:bodyPr/>
+          <a:lstStyle/>
+          <a:p>
+            <a:endParaRPr lang="en-US"/>
+          </a:p>
+        </p:txBody>
+      </p:sp>
+      <p:pic>
+        <p:nvPicPr>
+          <p:cNvPr id="4" name="Espace réservé du contenu 3" descr="C:\Users\salim\Documents\DonationCoder\ScreenshotCaptor\Screenshots\Screenshot - 9_28_2021 , 15_41_50.png"/>
+          <p:cNvPicPr>
+            <a:picLocks noGrp="1"/>
+          </p:cNvPicPr>
+          <p:nvPr>
+            <p:ph idx="1"/>
+          </p:nvPr>
+        </p:nvPicPr>
+        <p:blipFill>
+          <a:blip r:embed="rId2">
+            <a:extLst>
+              <a:ext uri="{28A0092B-C50C-407E-A947-70E740481C1C}">
+                <a14:useLocalDpi xmlns:a14="http://schemas.microsoft.com/office/drawing/2010/main" val="0"/>
+              </a:ext>
+            </a:extLst>
+          </a:blip>
+          <a:srcRect/>
+          <a:stretch>
+            <a:fillRect/>
+          </a:stretch>
+        </p:blipFill>
+        <p:spPr bwMode="auto">
+          <a:xfrm>
+            <a:off x="5049313" y="1825625"/>
+            <a:ext cx="2093373" cy="4351338"/>
+          </a:xfrm>
+          <a:prstGeom prst="rect">
+            <a:avLst/>
+          </a:prstGeom>
+          <a:noFill/>
+          <a:ln>
+            <a:noFill/>
+          </a:ln>
+        </p:spPr>
+      </p:pic>
+    </p:spTree>
+    <p:extLst>
+      <p:ext uri="{BB962C8B-B14F-4D97-AF65-F5344CB8AC3E}">
+        <p14:creationId xmlns:p14="http://schemas.microsoft.com/office/powerpoint/2010/main" val="1312451393"/>
+      </p:ext>
+    </p:extLst>
+  </p:cSld>
+  <p:clrMapOvr>
+    <a:masterClrMapping/>
+  </p:clrMapOvr>
+</p:sld>
+</file>
+
 <file path=ppt/slides/slide2.xml><?xml version="1.0" encoding="utf-8"?>
 <p:sld xmlns:a="http://schemas.openxmlformats.org/drawingml/2006/main" xmlns:r="http://schemas.openxmlformats.org/officeDocument/2006/relationships" xmlns:p="http://schemas.openxmlformats.org/presentationml/2006/main">
   <p:cSld>
@@ -7006,11 +7093,7 @@
             <a:pPr algn="ctr"/>
             <a:r>
               <a:rPr lang="fr-FR" b="1" u="sng" dirty="0" smtClean="0"/>
-              <a:t>Package </a:t>
-            </a:r>
-            <a:r>
-              <a:rPr lang="fr-FR" b="1" u="sng" dirty="0" smtClean="0"/>
-              <a:t>DB</a:t>
+              <a:t>Package DB</a:t>
             </a:r>
             <a:endParaRPr lang="en-US" b="1" u="sng" dirty="0"/>
           </a:p>
@@ -7247,11 +7330,7 @@
             <a:pPr algn="ctr"/>
             <a:r>
               <a:rPr lang="fr-FR" b="1" u="sng" dirty="0" smtClean="0"/>
-              <a:t>Package </a:t>
-            </a:r>
-            <a:r>
-              <a:rPr lang="fr-FR" b="1" u="sng" dirty="0" smtClean="0"/>
-              <a:t>DB</a:t>
+              <a:t>Package DB</a:t>
             </a:r>
             <a:endParaRPr lang="en-US" b="1" u="sng" dirty="0"/>
           </a:p>

</xml_diff>

<commit_message>
- Adding The Video Presentatio (.ppt)
</commit_message>
<xml_diff>
--- a/Présentation_image.pptx
+++ b/Présentation_image.pptx
@@ -18,6 +18,7 @@
     <p:sldId id="266" r:id="rId12"/>
     <p:sldId id="267" r:id="rId13"/>
     <p:sldId id="268" r:id="rId14"/>
+    <p:sldId id="269" r:id="rId15"/>
   </p:sldIdLst>
   <p:sldSz cx="12192000" cy="6858000"/>
   <p:notesSz cx="6858000" cy="9144000"/>
@@ -255,7 +256,7 @@
           <a:p>
             <a:fld id="{6D53E27C-41F9-477C-981C-F16B615EFA3D}" type="datetimeFigureOut">
               <a:rPr lang="en-US" smtClean="0"/>
-              <a:t>10/8/2021</a:t>
+              <a:t>10/12/2021</a:t>
             </a:fld>
             <a:endParaRPr lang="en-US"/>
           </a:p>
@@ -425,7 +426,7 @@
           <a:p>
             <a:fld id="{6D53E27C-41F9-477C-981C-F16B615EFA3D}" type="datetimeFigureOut">
               <a:rPr lang="en-US" smtClean="0"/>
-              <a:t>10/8/2021</a:t>
+              <a:t>10/12/2021</a:t>
             </a:fld>
             <a:endParaRPr lang="en-US"/>
           </a:p>
@@ -605,7 +606,7 @@
           <a:p>
             <a:fld id="{6D53E27C-41F9-477C-981C-F16B615EFA3D}" type="datetimeFigureOut">
               <a:rPr lang="en-US" smtClean="0"/>
-              <a:t>10/8/2021</a:t>
+              <a:t>10/12/2021</a:t>
             </a:fld>
             <a:endParaRPr lang="en-US"/>
           </a:p>
@@ -775,7 +776,7 @@
           <a:p>
             <a:fld id="{6D53E27C-41F9-477C-981C-F16B615EFA3D}" type="datetimeFigureOut">
               <a:rPr lang="en-US" smtClean="0"/>
-              <a:t>10/8/2021</a:t>
+              <a:t>10/12/2021</a:t>
             </a:fld>
             <a:endParaRPr lang="en-US"/>
           </a:p>
@@ -1021,7 +1022,7 @@
           <a:p>
             <a:fld id="{6D53E27C-41F9-477C-981C-F16B615EFA3D}" type="datetimeFigureOut">
               <a:rPr lang="en-US" smtClean="0"/>
-              <a:t>10/8/2021</a:t>
+              <a:t>10/12/2021</a:t>
             </a:fld>
             <a:endParaRPr lang="en-US"/>
           </a:p>
@@ -1253,7 +1254,7 @@
           <a:p>
             <a:fld id="{6D53E27C-41F9-477C-981C-F16B615EFA3D}" type="datetimeFigureOut">
               <a:rPr lang="en-US" smtClean="0"/>
-              <a:t>10/8/2021</a:t>
+              <a:t>10/12/2021</a:t>
             </a:fld>
             <a:endParaRPr lang="en-US"/>
           </a:p>
@@ -1620,7 +1621,7 @@
           <a:p>
             <a:fld id="{6D53E27C-41F9-477C-981C-F16B615EFA3D}" type="datetimeFigureOut">
               <a:rPr lang="en-US" smtClean="0"/>
-              <a:t>10/8/2021</a:t>
+              <a:t>10/12/2021</a:t>
             </a:fld>
             <a:endParaRPr lang="en-US"/>
           </a:p>
@@ -1738,7 +1739,7 @@
           <a:p>
             <a:fld id="{6D53E27C-41F9-477C-981C-F16B615EFA3D}" type="datetimeFigureOut">
               <a:rPr lang="en-US" smtClean="0"/>
-              <a:t>10/8/2021</a:t>
+              <a:t>10/12/2021</a:t>
             </a:fld>
             <a:endParaRPr lang="en-US"/>
           </a:p>
@@ -1833,7 +1834,7 @@
           <a:p>
             <a:fld id="{6D53E27C-41F9-477C-981C-F16B615EFA3D}" type="datetimeFigureOut">
               <a:rPr lang="en-US" smtClean="0"/>
-              <a:t>10/8/2021</a:t>
+              <a:t>10/12/2021</a:t>
             </a:fld>
             <a:endParaRPr lang="en-US"/>
           </a:p>
@@ -2110,7 +2111,7 @@
           <a:p>
             <a:fld id="{6D53E27C-41F9-477C-981C-F16B615EFA3D}" type="datetimeFigureOut">
               <a:rPr lang="en-US" smtClean="0"/>
-              <a:t>10/8/2021</a:t>
+              <a:t>10/12/2021</a:t>
             </a:fld>
             <a:endParaRPr lang="en-US"/>
           </a:p>
@@ -2363,7 +2364,7 @@
           <a:p>
             <a:fld id="{6D53E27C-41F9-477C-981C-F16B615EFA3D}" type="datetimeFigureOut">
               <a:rPr lang="en-US" smtClean="0"/>
-              <a:t>10/8/2021</a:t>
+              <a:t>10/12/2021</a:t>
             </a:fld>
             <a:endParaRPr lang="en-US"/>
           </a:p>
@@ -2576,7 +2577,7 @@
           <a:p>
             <a:fld id="{6D53E27C-41F9-477C-981C-F16B615EFA3D}" type="datetimeFigureOut">
               <a:rPr lang="en-US" smtClean="0"/>
-              <a:t>10/8/2021</a:t>
+              <a:t>10/12/2021</a:t>
             </a:fld>
             <a:endParaRPr lang="en-US"/>
           </a:p>
@@ -4388,6 +4389,155 @@
 </p:sld>
 </file>
 
+<file path=ppt/slides/slide14.xml><?xml version="1.0" encoding="utf-8"?>
+<p:sld xmlns:a="http://schemas.openxmlformats.org/drawingml/2006/main" xmlns:r="http://schemas.openxmlformats.org/officeDocument/2006/relationships" xmlns:p="http://schemas.openxmlformats.org/presentationml/2006/main">
+  <p:cSld>
+    <p:spTree>
+      <p:nvGrpSpPr>
+        <p:cNvPr id="1" name=""/>
+        <p:cNvGrpSpPr/>
+        <p:nvPr/>
+      </p:nvGrpSpPr>
+      <p:grpSpPr>
+        <a:xfrm>
+          <a:off x="0" y="0"/>
+          <a:ext cx="0" cy="0"/>
+          <a:chOff x="0" y="0"/>
+          <a:chExt cx="0" cy="0"/>
+        </a:xfrm>
+      </p:grpSpPr>
+      <p:pic>
+        <p:nvPicPr>
+          <p:cNvPr id="4" name="Espace réservé du contenu 3"/>
+          <p:cNvPicPr>
+            <a:picLocks noGrp="1" noChangeAspect="1"/>
+          </p:cNvPicPr>
+          <p:nvPr>
+            <p:ph idx="1"/>
+          </p:nvPr>
+        </p:nvPicPr>
+        <p:blipFill>
+          <a:blip r:embed="rId2">
+            <a:extLst>
+              <a:ext uri="{28A0092B-C50C-407E-A947-70E740481C1C}">
+                <a14:useLocalDpi xmlns:a14="http://schemas.microsoft.com/office/drawing/2010/main" val="0"/>
+              </a:ext>
+            </a:extLst>
+          </a:blip>
+          <a:stretch>
+            <a:fillRect/>
+          </a:stretch>
+        </p:blipFill>
+        <p:spPr>
+          <a:xfrm>
+            <a:off x="1851661" y="716926"/>
+            <a:ext cx="2690430" cy="5592396"/>
+          </a:xfrm>
+        </p:spPr>
+      </p:pic>
+      <p:pic>
+        <p:nvPicPr>
+          <p:cNvPr id="5" name="Image 4"/>
+          <p:cNvPicPr>
+            <a:picLocks noChangeAspect="1"/>
+          </p:cNvPicPr>
+          <p:nvPr/>
+        </p:nvPicPr>
+        <p:blipFill>
+          <a:blip r:embed="rId3">
+            <a:extLst>
+              <a:ext uri="{28A0092B-C50C-407E-A947-70E740481C1C}">
+                <a14:useLocalDpi xmlns:a14="http://schemas.microsoft.com/office/drawing/2010/main" val="0"/>
+              </a:ext>
+            </a:extLst>
+          </a:blip>
+          <a:stretch>
+            <a:fillRect/>
+          </a:stretch>
+        </p:blipFill>
+        <p:spPr>
+          <a:xfrm>
+            <a:off x="6464894" y="656399"/>
+            <a:ext cx="2686659" cy="5584557"/>
+          </a:xfrm>
+          <a:prstGeom prst="rect">
+            <a:avLst/>
+          </a:prstGeom>
+        </p:spPr>
+      </p:pic>
+      <p:sp>
+        <p:nvSpPr>
+          <p:cNvPr id="6" name="ZoneTexte 5"/>
+          <p:cNvSpPr txBox="1"/>
+          <p:nvPr/>
+        </p:nvSpPr>
+        <p:spPr>
+          <a:xfrm>
+            <a:off x="7122202" y="6263252"/>
+            <a:ext cx="1392882" cy="369332"/>
+          </a:xfrm>
+          <a:prstGeom prst="rect">
+            <a:avLst/>
+          </a:prstGeom>
+          <a:noFill/>
+        </p:spPr>
+        <p:txBody>
+          <a:bodyPr wrap="none" rtlCol="0">
+            <a:spAutoFit/>
+          </a:bodyPr>
+          <a:lstStyle/>
+          <a:p>
+            <a:r>
+              <a:rPr lang="fr-FR" dirty="0" smtClean="0"/>
+              <a:t>Format JSON</a:t>
+            </a:r>
+            <a:endParaRPr lang="en-US" dirty="0"/>
+          </a:p>
+        </p:txBody>
+      </p:sp>
+      <p:sp>
+        <p:nvSpPr>
+          <p:cNvPr id="7" name="ZoneTexte 6"/>
+          <p:cNvSpPr txBox="1"/>
+          <p:nvPr/>
+        </p:nvSpPr>
+        <p:spPr>
+          <a:xfrm>
+            <a:off x="2485207" y="6323888"/>
+            <a:ext cx="1463414" cy="369332"/>
+          </a:xfrm>
+          <a:prstGeom prst="rect">
+            <a:avLst/>
+          </a:prstGeom>
+          <a:noFill/>
+        </p:spPr>
+        <p:txBody>
+          <a:bodyPr wrap="none" rtlCol="0">
+            <a:spAutoFit/>
+          </a:bodyPr>
+          <a:lstStyle/>
+          <a:p>
+            <a:r>
+              <a:rPr lang="fr-FR" dirty="0" smtClean="0"/>
+              <a:t>Format HTML</a:t>
+            </a:r>
+            <a:endParaRPr lang="en-US" dirty="0"/>
+          </a:p>
+        </p:txBody>
+      </p:sp>
+    </p:spTree>
+    <p:extLst>
+      <p:ext uri="{BB962C8B-B14F-4D97-AF65-F5344CB8AC3E}">
+        <p14:creationId xmlns:p14="http://schemas.microsoft.com/office/powerpoint/2010/main" val="3059885318"/>
+      </p:ext>
+    </p:extLst>
+  </p:cSld>
+  <p:clrMapOvr>
+    <a:masterClrMapping/>
+  </p:clrMapOvr>
+</p:sld>
+</file>
+
 <file path=ppt/slides/slide2.xml><?xml version="1.0" encoding="utf-8"?>
 <p:sld xmlns:a="http://schemas.openxmlformats.org/drawingml/2006/main" xmlns:r="http://schemas.openxmlformats.org/officeDocument/2006/relationships" xmlns:p="http://schemas.openxmlformats.org/presentationml/2006/main">
   <p:cSld>

</xml_diff>

<commit_message>
-Updating the intership report in version Word and Pdf and the presentation (.ppt)
</commit_message>
<xml_diff>
--- a/Présentation_image.pptx
+++ b/Présentation_image.pptx
@@ -256,7 +256,7 @@
           <a:p>
             <a:fld id="{6D53E27C-41F9-477C-981C-F16B615EFA3D}" type="datetimeFigureOut">
               <a:rPr lang="en-US" smtClean="0"/>
-              <a:t>10/12/2021</a:t>
+              <a:t>10/13/2021</a:t>
             </a:fld>
             <a:endParaRPr lang="en-US"/>
           </a:p>
@@ -426,7 +426,7 @@
           <a:p>
             <a:fld id="{6D53E27C-41F9-477C-981C-F16B615EFA3D}" type="datetimeFigureOut">
               <a:rPr lang="en-US" smtClean="0"/>
-              <a:t>10/12/2021</a:t>
+              <a:t>10/13/2021</a:t>
             </a:fld>
             <a:endParaRPr lang="en-US"/>
           </a:p>
@@ -606,7 +606,7 @@
           <a:p>
             <a:fld id="{6D53E27C-41F9-477C-981C-F16B615EFA3D}" type="datetimeFigureOut">
               <a:rPr lang="en-US" smtClean="0"/>
-              <a:t>10/12/2021</a:t>
+              <a:t>10/13/2021</a:t>
             </a:fld>
             <a:endParaRPr lang="en-US"/>
           </a:p>
@@ -776,7 +776,7 @@
           <a:p>
             <a:fld id="{6D53E27C-41F9-477C-981C-F16B615EFA3D}" type="datetimeFigureOut">
               <a:rPr lang="en-US" smtClean="0"/>
-              <a:t>10/12/2021</a:t>
+              <a:t>10/13/2021</a:t>
             </a:fld>
             <a:endParaRPr lang="en-US"/>
           </a:p>
@@ -1022,7 +1022,7 @@
           <a:p>
             <a:fld id="{6D53E27C-41F9-477C-981C-F16B615EFA3D}" type="datetimeFigureOut">
               <a:rPr lang="en-US" smtClean="0"/>
-              <a:t>10/12/2021</a:t>
+              <a:t>10/13/2021</a:t>
             </a:fld>
             <a:endParaRPr lang="en-US"/>
           </a:p>
@@ -1254,7 +1254,7 @@
           <a:p>
             <a:fld id="{6D53E27C-41F9-477C-981C-F16B615EFA3D}" type="datetimeFigureOut">
               <a:rPr lang="en-US" smtClean="0"/>
-              <a:t>10/12/2021</a:t>
+              <a:t>10/13/2021</a:t>
             </a:fld>
             <a:endParaRPr lang="en-US"/>
           </a:p>
@@ -1621,7 +1621,7 @@
           <a:p>
             <a:fld id="{6D53E27C-41F9-477C-981C-F16B615EFA3D}" type="datetimeFigureOut">
               <a:rPr lang="en-US" smtClean="0"/>
-              <a:t>10/12/2021</a:t>
+              <a:t>10/13/2021</a:t>
             </a:fld>
             <a:endParaRPr lang="en-US"/>
           </a:p>
@@ -1739,7 +1739,7 @@
           <a:p>
             <a:fld id="{6D53E27C-41F9-477C-981C-F16B615EFA3D}" type="datetimeFigureOut">
               <a:rPr lang="en-US" smtClean="0"/>
-              <a:t>10/12/2021</a:t>
+              <a:t>10/13/2021</a:t>
             </a:fld>
             <a:endParaRPr lang="en-US"/>
           </a:p>
@@ -1834,7 +1834,7 @@
           <a:p>
             <a:fld id="{6D53E27C-41F9-477C-981C-F16B615EFA3D}" type="datetimeFigureOut">
               <a:rPr lang="en-US" smtClean="0"/>
-              <a:t>10/12/2021</a:t>
+              <a:t>10/13/2021</a:t>
             </a:fld>
             <a:endParaRPr lang="en-US"/>
           </a:p>
@@ -2111,7 +2111,7 @@
           <a:p>
             <a:fld id="{6D53E27C-41F9-477C-981C-F16B615EFA3D}" type="datetimeFigureOut">
               <a:rPr lang="en-US" smtClean="0"/>
-              <a:t>10/12/2021</a:t>
+              <a:t>10/13/2021</a:t>
             </a:fld>
             <a:endParaRPr lang="en-US"/>
           </a:p>
@@ -2364,7 +2364,7 @@
           <a:p>
             <a:fld id="{6D53E27C-41F9-477C-981C-F16B615EFA3D}" type="datetimeFigureOut">
               <a:rPr lang="en-US" smtClean="0"/>
-              <a:t>10/12/2021</a:t>
+              <a:t>10/13/2021</a:t>
             </a:fld>
             <a:endParaRPr lang="en-US"/>
           </a:p>
@@ -2577,7 +2577,7 @@
           <a:p>
             <a:fld id="{6D53E27C-41F9-477C-981C-F16B615EFA3D}" type="datetimeFigureOut">
               <a:rPr lang="en-US" smtClean="0"/>
-              <a:t>10/12/2021</a:t>
+              <a:t>10/13/2021</a:t>
             </a:fld>
             <a:endParaRPr lang="en-US"/>
           </a:p>

</xml_diff>